<commit_message>
Updates to v 0.32
Corrects an issue where NV distance should have been 0.4 m but was 0.45 m in visual assistance png files
Removes participant IDs as these will not be used in production
Adds a splash screen with logo cluster, title and version number
</commit_message>
<xml_diff>
--- a/Images2.pptx
+++ b/Images2.pptx
@@ -111,6 +111,11 @@
       </a:defRPr>
     </a:lvl9pPr>
   </p:defaultTextStyle>
+  <p:extLst>
+    <p:ext uri="{EFAFB233-063F-42B5-8137-9DF3F51BA10A}">
+      <p15:sldGuideLst xmlns:p15="http://schemas.microsoft.com/office/powerpoint/2012/main"/>
+    </p:ext>
+  </p:extLst>
 </p:presentation>
 </file>
 
@@ -245,7 +250,7 @@
           <a:p>
             <a:fld id="{DC66AFE5-9578-974E-B4E0-29FE1F8488A9}" type="datetimeFigureOut">
               <a:rPr lang="en-US" smtClean="0"/>
-              <a:t>3/21/24</a:t>
+              <a:t>4/9/24</a:t>
             </a:fld>
             <a:endParaRPr lang="en-US"/>
           </a:p>
@@ -415,7 +420,7 @@
           <a:p>
             <a:fld id="{DC66AFE5-9578-974E-B4E0-29FE1F8488A9}" type="datetimeFigureOut">
               <a:rPr lang="en-US" smtClean="0"/>
-              <a:t>3/21/24</a:t>
+              <a:t>4/9/24</a:t>
             </a:fld>
             <a:endParaRPr lang="en-US"/>
           </a:p>
@@ -595,7 +600,7 @@
           <a:p>
             <a:fld id="{DC66AFE5-9578-974E-B4E0-29FE1F8488A9}" type="datetimeFigureOut">
               <a:rPr lang="en-US" smtClean="0"/>
-              <a:t>3/21/24</a:t>
+              <a:t>4/9/24</a:t>
             </a:fld>
             <a:endParaRPr lang="en-US"/>
           </a:p>
@@ -765,7 +770,7 @@
           <a:p>
             <a:fld id="{DC66AFE5-9578-974E-B4E0-29FE1F8488A9}" type="datetimeFigureOut">
               <a:rPr lang="en-US" smtClean="0"/>
-              <a:t>3/21/24</a:t>
+              <a:t>4/9/24</a:t>
             </a:fld>
             <a:endParaRPr lang="en-US"/>
           </a:p>
@@ -1011,7 +1016,7 @@
           <a:p>
             <a:fld id="{DC66AFE5-9578-974E-B4E0-29FE1F8488A9}" type="datetimeFigureOut">
               <a:rPr lang="en-US" smtClean="0"/>
-              <a:t>3/21/24</a:t>
+              <a:t>4/9/24</a:t>
             </a:fld>
             <a:endParaRPr lang="en-US"/>
           </a:p>
@@ -1243,7 +1248,7 @@
           <a:p>
             <a:fld id="{DC66AFE5-9578-974E-B4E0-29FE1F8488A9}" type="datetimeFigureOut">
               <a:rPr lang="en-US" smtClean="0"/>
-              <a:t>3/21/24</a:t>
+              <a:t>4/9/24</a:t>
             </a:fld>
             <a:endParaRPr lang="en-US"/>
           </a:p>
@@ -1610,7 +1615,7 @@
           <a:p>
             <a:fld id="{DC66AFE5-9578-974E-B4E0-29FE1F8488A9}" type="datetimeFigureOut">
               <a:rPr lang="en-US" smtClean="0"/>
-              <a:t>3/21/24</a:t>
+              <a:t>4/9/24</a:t>
             </a:fld>
             <a:endParaRPr lang="en-US"/>
           </a:p>
@@ -1728,7 +1733,7 @@
           <a:p>
             <a:fld id="{DC66AFE5-9578-974E-B4E0-29FE1F8488A9}" type="datetimeFigureOut">
               <a:rPr lang="en-US" smtClean="0"/>
-              <a:t>3/21/24</a:t>
+              <a:t>4/9/24</a:t>
             </a:fld>
             <a:endParaRPr lang="en-US"/>
           </a:p>
@@ -1823,7 +1828,7 @@
           <a:p>
             <a:fld id="{DC66AFE5-9578-974E-B4E0-29FE1F8488A9}" type="datetimeFigureOut">
               <a:rPr lang="en-US" smtClean="0"/>
-              <a:t>3/21/24</a:t>
+              <a:t>4/9/24</a:t>
             </a:fld>
             <a:endParaRPr lang="en-US"/>
           </a:p>
@@ -2100,7 +2105,7 @@
           <a:p>
             <a:fld id="{DC66AFE5-9578-974E-B4E0-29FE1F8488A9}" type="datetimeFigureOut">
               <a:rPr lang="en-US" smtClean="0"/>
-              <a:t>3/21/24</a:t>
+              <a:t>4/9/24</a:t>
             </a:fld>
             <a:endParaRPr lang="en-US"/>
           </a:p>
@@ -2357,7 +2362,7 @@
           <a:p>
             <a:fld id="{DC66AFE5-9578-974E-B4E0-29FE1F8488A9}" type="datetimeFigureOut">
               <a:rPr lang="en-US" smtClean="0"/>
-              <a:t>3/21/24</a:t>
+              <a:t>4/9/24</a:t>
             </a:fld>
             <a:endParaRPr lang="en-US"/>
           </a:p>
@@ -2570,7 +2575,7 @@
           <a:p>
             <a:fld id="{DC66AFE5-9578-974E-B4E0-29FE1F8488A9}" type="datetimeFigureOut">
               <a:rPr lang="en-US" smtClean="0"/>
-              <a:t>3/21/24</a:t>
+              <a:t>4/9/24</a:t>
             </a:fld>
             <a:endParaRPr lang="en-US"/>
           </a:p>
@@ -4480,7 +4485,7 @@
             <a:pPr algn="ctr"/>
             <a:r>
               <a:rPr lang="en-US" sz="4500" b="1" dirty="0"/>
-              <a:t>0.45 m</a:t>
+              <a:t>0.40 m</a:t>
             </a:r>
           </a:p>
         </p:txBody>
@@ -4789,7 +4794,7 @@
             <a:pPr algn="ctr"/>
             <a:r>
               <a:rPr lang="en-US" sz="4500" b="1" dirty="0"/>
-              <a:t>0.45 m</a:t>
+              <a:t>0.40 m</a:t>
             </a:r>
           </a:p>
         </p:txBody>
@@ -5098,7 +5103,7 @@
             <a:pPr algn="ctr"/>
             <a:r>
               <a:rPr lang="en-US" sz="4500" b="1" dirty="0"/>
-              <a:t>0.45 m</a:t>
+              <a:t>0.40 m</a:t>
             </a:r>
           </a:p>
         </p:txBody>
@@ -5407,7 +5412,7 @@
             <a:pPr algn="ctr"/>
             <a:r>
               <a:rPr lang="en-US" sz="4500" b="1" dirty="0"/>
-              <a:t>0.45 m</a:t>
+              <a:t>0.40 m</a:t>
             </a:r>
           </a:p>
         </p:txBody>

</xml_diff>

<commit_message>
v0.33 Updates pinhole test for peek and adds new visuals
v0.33

Adds visual guides for pinhole test
Adds updated versions of all visual guides
Adds pinhole distance vision test for Peek tests
</commit_message>
<xml_diff>
--- a/Images2.pptx
+++ b/Images2.pptx
@@ -7,12 +7,14 @@
   <p:sldIdLst>
     <p:sldId id="256" r:id="rId2"/>
     <p:sldId id="258" r:id="rId3"/>
-    <p:sldId id="257" r:id="rId4"/>
-    <p:sldId id="259" r:id="rId5"/>
-    <p:sldId id="260" r:id="rId6"/>
-    <p:sldId id="262" r:id="rId7"/>
-    <p:sldId id="261" r:id="rId8"/>
-    <p:sldId id="263" r:id="rId9"/>
+    <p:sldId id="264" r:id="rId4"/>
+    <p:sldId id="265" r:id="rId5"/>
+    <p:sldId id="257" r:id="rId6"/>
+    <p:sldId id="259" r:id="rId7"/>
+    <p:sldId id="260" r:id="rId8"/>
+    <p:sldId id="262" r:id="rId9"/>
+    <p:sldId id="261" r:id="rId10"/>
+    <p:sldId id="263" r:id="rId11"/>
   </p:sldIdLst>
   <p:sldSz cx="6858000" cy="6858000"/>
   <p:notesSz cx="6858000" cy="9144000"/>
@@ -250,7 +252,7 @@
           <a:p>
             <a:fld id="{DC66AFE5-9578-974E-B4E0-29FE1F8488A9}" type="datetimeFigureOut">
               <a:rPr lang="en-US" smtClean="0"/>
-              <a:t>4/9/24</a:t>
+              <a:t>4/10/24</a:t>
             </a:fld>
             <a:endParaRPr lang="en-US"/>
           </a:p>
@@ -420,7 +422,7 @@
           <a:p>
             <a:fld id="{DC66AFE5-9578-974E-B4E0-29FE1F8488A9}" type="datetimeFigureOut">
               <a:rPr lang="en-US" smtClean="0"/>
-              <a:t>4/9/24</a:t>
+              <a:t>4/10/24</a:t>
             </a:fld>
             <a:endParaRPr lang="en-US"/>
           </a:p>
@@ -600,7 +602,7 @@
           <a:p>
             <a:fld id="{DC66AFE5-9578-974E-B4E0-29FE1F8488A9}" type="datetimeFigureOut">
               <a:rPr lang="en-US" smtClean="0"/>
-              <a:t>4/9/24</a:t>
+              <a:t>4/10/24</a:t>
             </a:fld>
             <a:endParaRPr lang="en-US"/>
           </a:p>
@@ -770,7 +772,7 @@
           <a:p>
             <a:fld id="{DC66AFE5-9578-974E-B4E0-29FE1F8488A9}" type="datetimeFigureOut">
               <a:rPr lang="en-US" smtClean="0"/>
-              <a:t>4/9/24</a:t>
+              <a:t>4/10/24</a:t>
             </a:fld>
             <a:endParaRPr lang="en-US"/>
           </a:p>
@@ -1016,7 +1018,7 @@
           <a:p>
             <a:fld id="{DC66AFE5-9578-974E-B4E0-29FE1F8488A9}" type="datetimeFigureOut">
               <a:rPr lang="en-US" smtClean="0"/>
-              <a:t>4/9/24</a:t>
+              <a:t>4/10/24</a:t>
             </a:fld>
             <a:endParaRPr lang="en-US"/>
           </a:p>
@@ -1248,7 +1250,7 @@
           <a:p>
             <a:fld id="{DC66AFE5-9578-974E-B4E0-29FE1F8488A9}" type="datetimeFigureOut">
               <a:rPr lang="en-US" smtClean="0"/>
-              <a:t>4/9/24</a:t>
+              <a:t>4/10/24</a:t>
             </a:fld>
             <a:endParaRPr lang="en-US"/>
           </a:p>
@@ -1615,7 +1617,7 @@
           <a:p>
             <a:fld id="{DC66AFE5-9578-974E-B4E0-29FE1F8488A9}" type="datetimeFigureOut">
               <a:rPr lang="en-US" smtClean="0"/>
-              <a:t>4/9/24</a:t>
+              <a:t>4/10/24</a:t>
             </a:fld>
             <a:endParaRPr lang="en-US"/>
           </a:p>
@@ -1733,7 +1735,7 @@
           <a:p>
             <a:fld id="{DC66AFE5-9578-974E-B4E0-29FE1F8488A9}" type="datetimeFigureOut">
               <a:rPr lang="en-US" smtClean="0"/>
-              <a:t>4/9/24</a:t>
+              <a:t>4/10/24</a:t>
             </a:fld>
             <a:endParaRPr lang="en-US"/>
           </a:p>
@@ -1828,7 +1830,7 @@
           <a:p>
             <a:fld id="{DC66AFE5-9578-974E-B4E0-29FE1F8488A9}" type="datetimeFigureOut">
               <a:rPr lang="en-US" smtClean="0"/>
-              <a:t>4/9/24</a:t>
+              <a:t>4/10/24</a:t>
             </a:fld>
             <a:endParaRPr lang="en-US"/>
           </a:p>
@@ -2105,7 +2107,7 @@
           <a:p>
             <a:fld id="{DC66AFE5-9578-974E-B4E0-29FE1F8488A9}" type="datetimeFigureOut">
               <a:rPr lang="en-US" smtClean="0"/>
-              <a:t>4/9/24</a:t>
+              <a:t>4/10/24</a:t>
             </a:fld>
             <a:endParaRPr lang="en-US"/>
           </a:p>
@@ -2362,7 +2364,7 @@
           <a:p>
             <a:fld id="{DC66AFE5-9578-974E-B4E0-29FE1F8488A9}" type="datetimeFigureOut">
               <a:rPr lang="en-US" smtClean="0"/>
-              <a:t>4/9/24</a:t>
+              <a:t>4/10/24</a:t>
             </a:fld>
             <a:endParaRPr lang="en-US"/>
           </a:p>
@@ -2575,7 +2577,7 @@
           <a:p>
             <a:fld id="{DC66AFE5-9578-974E-B4E0-29FE1F8488A9}" type="datetimeFigureOut">
               <a:rPr lang="en-US" smtClean="0"/>
-              <a:t>4/9/24</a:t>
+              <a:t>4/10/24</a:t>
             </a:fld>
             <a:endParaRPr lang="en-US"/>
           </a:p>
@@ -2982,51 +2984,790 @@
       </p:grpSpPr>
       <p:pic>
         <p:nvPicPr>
-          <p:cNvPr id="1026" name="Picture 2" descr="Create a simple clipart illustration of a pair of eyes. The design should be minimalist, using clean lines and limited color to convey the shape and expression of the eyes in a stylized manner. This clipart should be straightforward, focusing on the essential features of the eyes without intricate details, suitable for use in various graphic design contexts where simplicity and clarity are key.">
+          <p:cNvPr id="2" name="Picture 1" descr="A drawing of a eye&#10;&#10;Description automatically generated">
             <a:extLst>
               <a:ext uri="{FF2B5EF4-FFF2-40B4-BE49-F238E27FC236}">
-                <a16:creationId xmlns:a16="http://schemas.microsoft.com/office/drawing/2014/main" id="{C304A54A-5FAF-4BAA-206F-51FC8660B9C7}"/>
+                <a16:creationId xmlns:a16="http://schemas.microsoft.com/office/drawing/2014/main" id="{450697E4-4F14-8E1E-C94C-4DF5A930971F}"/>
               </a:ext>
             </a:extLst>
           </p:cNvPr>
           <p:cNvPicPr>
-            <a:picLocks noChangeAspect="1" noChangeArrowheads="1"/>
+            <a:picLocks noChangeAspect="1"/>
           </p:cNvPicPr>
           <p:nvPr/>
         </p:nvPicPr>
         <p:blipFill>
-          <a:blip r:embed="rId2">
-            <a:extLst>
-              <a:ext uri="{28A0092B-C50C-407E-A947-70E740481C1C}">
-                <a14:useLocalDpi xmlns:a14="http://schemas.microsoft.com/office/drawing/2010/main" val="0"/>
-              </a:ext>
-            </a:extLst>
-          </a:blip>
-          <a:srcRect/>
+          <a:blip r:embed="rId2"/>
           <a:stretch>
             <a:fillRect/>
           </a:stretch>
         </p:blipFill>
-        <p:spPr bwMode="auto">
-          <a:xfrm>
-            <a:off x="0" y="0"/>
+        <p:spPr>
+          <a:xfrm flipH="1">
+            <a:off x="0" y="-14965"/>
             <a:ext cx="6858000" cy="6858000"/>
           </a:xfrm>
           <a:prstGeom prst="rect">
             <a:avLst/>
           </a:prstGeom>
-          <a:noFill/>
-          <a:extLst>
-            <a:ext uri="{909E8E84-426E-40DD-AFC4-6F175D3DCCD1}">
-              <a14:hiddenFill xmlns:a14="http://schemas.microsoft.com/office/drawing/2010/main">
-                <a:solidFill>
-                  <a:srgbClr val="FFFFFF"/>
-                </a:solidFill>
-              </a14:hiddenFill>
-            </a:ext>
-          </a:extLst>
         </p:spPr>
       </p:pic>
+      <p:grpSp>
+        <p:nvGrpSpPr>
+          <p:cNvPr id="3" name="Group 2">
+            <a:extLst>
+              <a:ext uri="{FF2B5EF4-FFF2-40B4-BE49-F238E27FC236}">
+                <a16:creationId xmlns:a16="http://schemas.microsoft.com/office/drawing/2014/main" id="{9EF1A7B1-AE53-543D-D59B-CF17493DEC25}"/>
+              </a:ext>
+            </a:extLst>
+          </p:cNvPr>
+          <p:cNvGrpSpPr/>
+          <p:nvPr/>
+        </p:nvGrpSpPr>
+        <p:grpSpPr>
+          <a:xfrm>
+            <a:off x="4248312" y="2399416"/>
+            <a:ext cx="1870838" cy="1870838"/>
+            <a:chOff x="940099" y="2485286"/>
+            <a:chExt cx="1870838" cy="1870838"/>
+          </a:xfrm>
+        </p:grpSpPr>
+        <p:sp>
+          <p:nvSpPr>
+            <p:cNvPr id="6" name="Oval 5">
+              <a:extLst>
+                <a:ext uri="{FF2B5EF4-FFF2-40B4-BE49-F238E27FC236}">
+                  <a16:creationId xmlns:a16="http://schemas.microsoft.com/office/drawing/2014/main" id="{C25F5E28-4ABF-12CD-375F-C08F29EB6186}"/>
+                </a:ext>
+              </a:extLst>
+            </p:cNvPr>
+            <p:cNvSpPr/>
+            <p:nvPr/>
+          </p:nvSpPr>
+          <p:spPr>
+            <a:xfrm>
+              <a:off x="940099" y="2485286"/>
+              <a:ext cx="1870838" cy="1870838"/>
+            </a:xfrm>
+            <a:prstGeom prst="ellipse">
+              <a:avLst/>
+            </a:prstGeom>
+            <a:solidFill>
+              <a:srgbClr val="062438"/>
+            </a:solidFill>
+          </p:spPr>
+          <p:style>
+            <a:lnRef idx="2">
+              <a:schemeClr val="accent1">
+                <a:shade val="15000"/>
+              </a:schemeClr>
+            </a:lnRef>
+            <a:fillRef idx="1">
+              <a:schemeClr val="accent1"/>
+            </a:fillRef>
+            <a:effectRef idx="0">
+              <a:schemeClr val="accent1"/>
+            </a:effectRef>
+            <a:fontRef idx="minor">
+              <a:schemeClr val="lt1"/>
+            </a:fontRef>
+          </p:style>
+          <p:txBody>
+            <a:bodyPr rtlCol="0" anchor="ctr"/>
+            <a:lstStyle/>
+            <a:p>
+              <a:pPr algn="ctr"/>
+              <a:endParaRPr lang="en-US" dirty="0"/>
+            </a:p>
+          </p:txBody>
+        </p:sp>
+        <p:sp>
+          <p:nvSpPr>
+            <p:cNvPr id="8" name="Oval 7">
+              <a:extLst>
+                <a:ext uri="{FF2B5EF4-FFF2-40B4-BE49-F238E27FC236}">
+                  <a16:creationId xmlns:a16="http://schemas.microsoft.com/office/drawing/2014/main" id="{61E714DA-D63A-C465-47AC-CF2E3072814B}"/>
+                </a:ext>
+              </a:extLst>
+            </p:cNvPr>
+            <p:cNvSpPr/>
+            <p:nvPr/>
+          </p:nvSpPr>
+          <p:spPr>
+            <a:xfrm>
+              <a:off x="1818290" y="2737077"/>
+              <a:ext cx="157656" cy="157656"/>
+            </a:xfrm>
+            <a:prstGeom prst="ellipse">
+              <a:avLst/>
+            </a:prstGeom>
+            <a:solidFill>
+              <a:schemeClr val="bg1"/>
+            </a:solidFill>
+          </p:spPr>
+          <p:style>
+            <a:lnRef idx="2">
+              <a:schemeClr val="accent1">
+                <a:shade val="15000"/>
+              </a:schemeClr>
+            </a:lnRef>
+            <a:fillRef idx="1">
+              <a:schemeClr val="accent1"/>
+            </a:fillRef>
+            <a:effectRef idx="0">
+              <a:schemeClr val="accent1"/>
+            </a:effectRef>
+            <a:fontRef idx="minor">
+              <a:schemeClr val="lt1"/>
+            </a:fontRef>
+          </p:style>
+          <p:txBody>
+            <a:bodyPr rtlCol="0" anchor="ctr"/>
+            <a:lstStyle/>
+            <a:p>
+              <a:pPr algn="ctr"/>
+              <a:endParaRPr lang="en-US"/>
+            </a:p>
+          </p:txBody>
+        </p:sp>
+        <p:sp>
+          <p:nvSpPr>
+            <p:cNvPr id="9" name="Oval 8">
+              <a:extLst>
+                <a:ext uri="{FF2B5EF4-FFF2-40B4-BE49-F238E27FC236}">
+                  <a16:creationId xmlns:a16="http://schemas.microsoft.com/office/drawing/2014/main" id="{6F109960-E78B-41D6-5697-53D4E6E7D470}"/>
+                </a:ext>
+              </a:extLst>
+            </p:cNvPr>
+            <p:cNvSpPr/>
+            <p:nvPr/>
+          </p:nvSpPr>
+          <p:spPr>
+            <a:xfrm>
+              <a:off x="2372690" y="3183477"/>
+              <a:ext cx="157656" cy="157656"/>
+            </a:xfrm>
+            <a:prstGeom prst="ellipse">
+              <a:avLst/>
+            </a:prstGeom>
+            <a:solidFill>
+              <a:schemeClr val="bg1"/>
+            </a:solidFill>
+          </p:spPr>
+          <p:style>
+            <a:lnRef idx="2">
+              <a:schemeClr val="accent1">
+                <a:shade val="15000"/>
+              </a:schemeClr>
+            </a:lnRef>
+            <a:fillRef idx="1">
+              <a:schemeClr val="accent1"/>
+            </a:fillRef>
+            <a:effectRef idx="0">
+              <a:schemeClr val="accent1"/>
+            </a:effectRef>
+            <a:fontRef idx="minor">
+              <a:schemeClr val="lt1"/>
+            </a:fontRef>
+          </p:style>
+          <p:txBody>
+            <a:bodyPr rtlCol="0" anchor="ctr"/>
+            <a:lstStyle/>
+            <a:p>
+              <a:pPr algn="ctr"/>
+              <a:endParaRPr lang="en-US"/>
+            </a:p>
+          </p:txBody>
+        </p:sp>
+        <p:sp>
+          <p:nvSpPr>
+            <p:cNvPr id="10" name="Oval 9">
+              <a:extLst>
+                <a:ext uri="{FF2B5EF4-FFF2-40B4-BE49-F238E27FC236}">
+                  <a16:creationId xmlns:a16="http://schemas.microsoft.com/office/drawing/2014/main" id="{ECB4B2CB-9BF8-2A37-361F-97E442C50C4E}"/>
+                </a:ext>
+              </a:extLst>
+            </p:cNvPr>
+            <p:cNvSpPr/>
+            <p:nvPr/>
+          </p:nvSpPr>
+          <p:spPr>
+            <a:xfrm>
+              <a:off x="2127890" y="3845877"/>
+              <a:ext cx="157656" cy="157656"/>
+            </a:xfrm>
+            <a:prstGeom prst="ellipse">
+              <a:avLst/>
+            </a:prstGeom>
+            <a:solidFill>
+              <a:schemeClr val="bg1"/>
+            </a:solidFill>
+          </p:spPr>
+          <p:style>
+            <a:lnRef idx="2">
+              <a:schemeClr val="accent1">
+                <a:shade val="15000"/>
+              </a:schemeClr>
+            </a:lnRef>
+            <a:fillRef idx="1">
+              <a:schemeClr val="accent1"/>
+            </a:fillRef>
+            <a:effectRef idx="0">
+              <a:schemeClr val="accent1"/>
+            </a:effectRef>
+            <a:fontRef idx="minor">
+              <a:schemeClr val="lt1"/>
+            </a:fontRef>
+          </p:style>
+          <p:txBody>
+            <a:bodyPr rtlCol="0" anchor="ctr"/>
+            <a:lstStyle/>
+            <a:p>
+              <a:pPr algn="ctr"/>
+              <a:endParaRPr lang="en-US"/>
+            </a:p>
+          </p:txBody>
+        </p:sp>
+        <p:sp>
+          <p:nvSpPr>
+            <p:cNvPr id="11" name="Oval 10">
+              <a:extLst>
+                <a:ext uri="{FF2B5EF4-FFF2-40B4-BE49-F238E27FC236}">
+                  <a16:creationId xmlns:a16="http://schemas.microsoft.com/office/drawing/2014/main" id="{F9695B98-D445-19BD-E5EB-C11F09AC3972}"/>
+                </a:ext>
+              </a:extLst>
+            </p:cNvPr>
+            <p:cNvSpPr/>
+            <p:nvPr/>
+          </p:nvSpPr>
+          <p:spPr>
+            <a:xfrm>
+              <a:off x="1422290" y="3817077"/>
+              <a:ext cx="157656" cy="157656"/>
+            </a:xfrm>
+            <a:prstGeom prst="ellipse">
+              <a:avLst/>
+            </a:prstGeom>
+            <a:solidFill>
+              <a:schemeClr val="bg1"/>
+            </a:solidFill>
+          </p:spPr>
+          <p:style>
+            <a:lnRef idx="2">
+              <a:schemeClr val="accent1">
+                <a:shade val="15000"/>
+              </a:schemeClr>
+            </a:lnRef>
+            <a:fillRef idx="1">
+              <a:schemeClr val="accent1"/>
+            </a:fillRef>
+            <a:effectRef idx="0">
+              <a:schemeClr val="accent1"/>
+            </a:effectRef>
+            <a:fontRef idx="minor">
+              <a:schemeClr val="lt1"/>
+            </a:fontRef>
+          </p:style>
+          <p:txBody>
+            <a:bodyPr rtlCol="0" anchor="ctr"/>
+            <a:lstStyle/>
+            <a:p>
+              <a:pPr algn="ctr"/>
+              <a:endParaRPr lang="en-US"/>
+            </a:p>
+          </p:txBody>
+        </p:sp>
+        <p:sp>
+          <p:nvSpPr>
+            <p:cNvPr id="12" name="Oval 11">
+              <a:extLst>
+                <a:ext uri="{FF2B5EF4-FFF2-40B4-BE49-F238E27FC236}">
+                  <a16:creationId xmlns:a16="http://schemas.microsoft.com/office/drawing/2014/main" id="{5D99FEAC-95C7-5936-1B58-5ABCAF5640F7}"/>
+                </a:ext>
+              </a:extLst>
+            </p:cNvPr>
+            <p:cNvSpPr/>
+            <p:nvPr/>
+          </p:nvSpPr>
+          <p:spPr>
+            <a:xfrm>
+              <a:off x="1220690" y="3125877"/>
+              <a:ext cx="157656" cy="157656"/>
+            </a:xfrm>
+            <a:prstGeom prst="ellipse">
+              <a:avLst/>
+            </a:prstGeom>
+            <a:solidFill>
+              <a:schemeClr val="bg1"/>
+            </a:solidFill>
+          </p:spPr>
+          <p:style>
+            <a:lnRef idx="2">
+              <a:schemeClr val="accent1">
+                <a:shade val="15000"/>
+              </a:schemeClr>
+            </a:lnRef>
+            <a:fillRef idx="1">
+              <a:schemeClr val="accent1"/>
+            </a:fillRef>
+            <a:effectRef idx="0">
+              <a:schemeClr val="accent1"/>
+            </a:effectRef>
+            <a:fontRef idx="minor">
+              <a:schemeClr val="lt1"/>
+            </a:fontRef>
+          </p:style>
+          <p:txBody>
+            <a:bodyPr rtlCol="0" anchor="ctr"/>
+            <a:lstStyle/>
+            <a:p>
+              <a:pPr algn="ctr"/>
+              <a:endParaRPr lang="en-US"/>
+            </a:p>
+          </p:txBody>
+        </p:sp>
+        <p:sp>
+          <p:nvSpPr>
+            <p:cNvPr id="15" name="Oval 14">
+              <a:extLst>
+                <a:ext uri="{FF2B5EF4-FFF2-40B4-BE49-F238E27FC236}">
+                  <a16:creationId xmlns:a16="http://schemas.microsoft.com/office/drawing/2014/main" id="{FC4E22C6-BDED-8B33-3A7D-BD78E3E3A22B}"/>
+                </a:ext>
+              </a:extLst>
+            </p:cNvPr>
+            <p:cNvSpPr/>
+            <p:nvPr/>
+          </p:nvSpPr>
+          <p:spPr>
+            <a:xfrm>
+              <a:off x="1523090" y="3183477"/>
+              <a:ext cx="157656" cy="157656"/>
+            </a:xfrm>
+            <a:prstGeom prst="ellipse">
+              <a:avLst/>
+            </a:prstGeom>
+            <a:solidFill>
+              <a:schemeClr val="bg1"/>
+            </a:solidFill>
+          </p:spPr>
+          <p:style>
+            <a:lnRef idx="2">
+              <a:schemeClr val="accent1">
+                <a:shade val="15000"/>
+              </a:schemeClr>
+            </a:lnRef>
+            <a:fillRef idx="1">
+              <a:schemeClr val="accent1"/>
+            </a:fillRef>
+            <a:effectRef idx="0">
+              <a:schemeClr val="accent1"/>
+            </a:effectRef>
+            <a:fontRef idx="minor">
+              <a:schemeClr val="lt1"/>
+            </a:fontRef>
+          </p:style>
+          <p:txBody>
+            <a:bodyPr rtlCol="0" anchor="ctr"/>
+            <a:lstStyle/>
+            <a:p>
+              <a:pPr algn="ctr"/>
+              <a:endParaRPr lang="en-US"/>
+            </a:p>
+          </p:txBody>
+        </p:sp>
+        <p:sp>
+          <p:nvSpPr>
+            <p:cNvPr id="17" name="Oval 16">
+              <a:extLst>
+                <a:ext uri="{FF2B5EF4-FFF2-40B4-BE49-F238E27FC236}">
+                  <a16:creationId xmlns:a16="http://schemas.microsoft.com/office/drawing/2014/main" id="{E8E416A6-CEC2-E35D-70A3-9083D0165D04}"/>
+                </a:ext>
+              </a:extLst>
+            </p:cNvPr>
+            <p:cNvSpPr/>
+            <p:nvPr/>
+          </p:nvSpPr>
+          <p:spPr>
+            <a:xfrm>
+              <a:off x="1703090" y="3046677"/>
+              <a:ext cx="157656" cy="157656"/>
+            </a:xfrm>
+            <a:prstGeom prst="ellipse">
+              <a:avLst/>
+            </a:prstGeom>
+            <a:solidFill>
+              <a:schemeClr val="bg1"/>
+            </a:solidFill>
+          </p:spPr>
+          <p:style>
+            <a:lnRef idx="2">
+              <a:schemeClr val="accent1">
+                <a:shade val="15000"/>
+              </a:schemeClr>
+            </a:lnRef>
+            <a:fillRef idx="1">
+              <a:schemeClr val="accent1"/>
+            </a:fillRef>
+            <a:effectRef idx="0">
+              <a:schemeClr val="accent1"/>
+            </a:effectRef>
+            <a:fontRef idx="minor">
+              <a:schemeClr val="lt1"/>
+            </a:fontRef>
+          </p:style>
+          <p:txBody>
+            <a:bodyPr rtlCol="0" anchor="ctr"/>
+            <a:lstStyle/>
+            <a:p>
+              <a:pPr algn="ctr"/>
+              <a:endParaRPr lang="en-US"/>
+            </a:p>
+          </p:txBody>
+        </p:sp>
+        <p:sp>
+          <p:nvSpPr>
+            <p:cNvPr id="18" name="Oval 17">
+              <a:extLst>
+                <a:ext uri="{FF2B5EF4-FFF2-40B4-BE49-F238E27FC236}">
+                  <a16:creationId xmlns:a16="http://schemas.microsoft.com/office/drawing/2014/main" id="{DF66A1F6-BE73-0E13-D306-E0180487F8D6}"/>
+                </a:ext>
+              </a:extLst>
+            </p:cNvPr>
+            <p:cNvSpPr/>
+            <p:nvPr/>
+          </p:nvSpPr>
+          <p:spPr>
+            <a:xfrm>
+              <a:off x="1926290" y="3075477"/>
+              <a:ext cx="157656" cy="157656"/>
+            </a:xfrm>
+            <a:prstGeom prst="ellipse">
+              <a:avLst/>
+            </a:prstGeom>
+            <a:solidFill>
+              <a:schemeClr val="bg1"/>
+            </a:solidFill>
+          </p:spPr>
+          <p:style>
+            <a:lnRef idx="2">
+              <a:schemeClr val="accent1">
+                <a:shade val="15000"/>
+              </a:schemeClr>
+            </a:lnRef>
+            <a:fillRef idx="1">
+              <a:schemeClr val="accent1"/>
+            </a:fillRef>
+            <a:effectRef idx="0">
+              <a:schemeClr val="accent1"/>
+            </a:effectRef>
+            <a:fontRef idx="minor">
+              <a:schemeClr val="lt1"/>
+            </a:fontRef>
+          </p:style>
+          <p:txBody>
+            <a:bodyPr rtlCol="0" anchor="ctr"/>
+            <a:lstStyle/>
+            <a:p>
+              <a:pPr algn="ctr"/>
+              <a:endParaRPr lang="en-US"/>
+            </a:p>
+          </p:txBody>
+        </p:sp>
+        <p:sp>
+          <p:nvSpPr>
+            <p:cNvPr id="19" name="Oval 18">
+              <a:extLst>
+                <a:ext uri="{FF2B5EF4-FFF2-40B4-BE49-F238E27FC236}">
+                  <a16:creationId xmlns:a16="http://schemas.microsoft.com/office/drawing/2014/main" id="{026CC1D2-4B96-E14C-A419-77D8489D4A18}"/>
+                </a:ext>
+              </a:extLst>
+            </p:cNvPr>
+            <p:cNvSpPr/>
+            <p:nvPr/>
+          </p:nvSpPr>
+          <p:spPr>
+            <a:xfrm>
+              <a:off x="2077490" y="3255477"/>
+              <a:ext cx="157656" cy="157656"/>
+            </a:xfrm>
+            <a:prstGeom prst="ellipse">
+              <a:avLst/>
+            </a:prstGeom>
+            <a:solidFill>
+              <a:schemeClr val="bg1"/>
+            </a:solidFill>
+          </p:spPr>
+          <p:style>
+            <a:lnRef idx="2">
+              <a:schemeClr val="accent1">
+                <a:shade val="15000"/>
+              </a:schemeClr>
+            </a:lnRef>
+            <a:fillRef idx="1">
+              <a:schemeClr val="accent1"/>
+            </a:fillRef>
+            <a:effectRef idx="0">
+              <a:schemeClr val="accent1"/>
+            </a:effectRef>
+            <a:fontRef idx="minor">
+              <a:schemeClr val="lt1"/>
+            </a:fontRef>
+          </p:style>
+          <p:txBody>
+            <a:bodyPr rtlCol="0" anchor="ctr"/>
+            <a:lstStyle/>
+            <a:p>
+              <a:pPr algn="ctr"/>
+              <a:endParaRPr lang="en-US"/>
+            </a:p>
+          </p:txBody>
+        </p:sp>
+        <p:sp>
+          <p:nvSpPr>
+            <p:cNvPr id="20" name="Oval 19">
+              <a:extLst>
+                <a:ext uri="{FF2B5EF4-FFF2-40B4-BE49-F238E27FC236}">
+                  <a16:creationId xmlns:a16="http://schemas.microsoft.com/office/drawing/2014/main" id="{93CC893A-8133-BB8E-034F-781CA19FDFCA}"/>
+                </a:ext>
+              </a:extLst>
+            </p:cNvPr>
+            <p:cNvSpPr/>
+            <p:nvPr/>
+          </p:nvSpPr>
+          <p:spPr>
+            <a:xfrm>
+              <a:off x="2063090" y="3478677"/>
+              <a:ext cx="157656" cy="157656"/>
+            </a:xfrm>
+            <a:prstGeom prst="ellipse">
+              <a:avLst/>
+            </a:prstGeom>
+            <a:solidFill>
+              <a:schemeClr val="bg1"/>
+            </a:solidFill>
+          </p:spPr>
+          <p:style>
+            <a:lnRef idx="2">
+              <a:schemeClr val="accent1">
+                <a:shade val="15000"/>
+              </a:schemeClr>
+            </a:lnRef>
+            <a:fillRef idx="1">
+              <a:schemeClr val="accent1"/>
+            </a:fillRef>
+            <a:effectRef idx="0">
+              <a:schemeClr val="accent1"/>
+            </a:effectRef>
+            <a:fontRef idx="minor">
+              <a:schemeClr val="lt1"/>
+            </a:fontRef>
+          </p:style>
+          <p:txBody>
+            <a:bodyPr rtlCol="0" anchor="ctr"/>
+            <a:lstStyle/>
+            <a:p>
+              <a:pPr algn="ctr"/>
+              <a:endParaRPr lang="en-US"/>
+            </a:p>
+          </p:txBody>
+        </p:sp>
+        <p:sp>
+          <p:nvSpPr>
+            <p:cNvPr id="21" name="Oval 20">
+              <a:extLst>
+                <a:ext uri="{FF2B5EF4-FFF2-40B4-BE49-F238E27FC236}">
+                  <a16:creationId xmlns:a16="http://schemas.microsoft.com/office/drawing/2014/main" id="{747631EE-A518-B49C-FB82-CF04C780B015}"/>
+                </a:ext>
+              </a:extLst>
+            </p:cNvPr>
+            <p:cNvSpPr/>
+            <p:nvPr/>
+          </p:nvSpPr>
+          <p:spPr>
+            <a:xfrm>
+              <a:off x="1875890" y="3629877"/>
+              <a:ext cx="157656" cy="157656"/>
+            </a:xfrm>
+            <a:prstGeom prst="ellipse">
+              <a:avLst/>
+            </a:prstGeom>
+            <a:solidFill>
+              <a:schemeClr val="bg1"/>
+            </a:solidFill>
+          </p:spPr>
+          <p:style>
+            <a:lnRef idx="2">
+              <a:schemeClr val="accent1">
+                <a:shade val="15000"/>
+              </a:schemeClr>
+            </a:lnRef>
+            <a:fillRef idx="1">
+              <a:schemeClr val="accent1"/>
+            </a:fillRef>
+            <a:effectRef idx="0">
+              <a:schemeClr val="accent1"/>
+            </a:effectRef>
+            <a:fontRef idx="minor">
+              <a:schemeClr val="lt1"/>
+            </a:fontRef>
+          </p:style>
+          <p:txBody>
+            <a:bodyPr rtlCol="0" anchor="ctr"/>
+            <a:lstStyle/>
+            <a:p>
+              <a:pPr algn="ctr"/>
+              <a:endParaRPr lang="en-US"/>
+            </a:p>
+          </p:txBody>
+        </p:sp>
+        <p:sp>
+          <p:nvSpPr>
+            <p:cNvPr id="22" name="Oval 21">
+              <a:extLst>
+                <a:ext uri="{FF2B5EF4-FFF2-40B4-BE49-F238E27FC236}">
+                  <a16:creationId xmlns:a16="http://schemas.microsoft.com/office/drawing/2014/main" id="{9629D132-40C0-1783-94B5-7AE3F463AB76}"/>
+                </a:ext>
+              </a:extLst>
+            </p:cNvPr>
+            <p:cNvSpPr/>
+            <p:nvPr/>
+          </p:nvSpPr>
+          <p:spPr>
+            <a:xfrm>
+              <a:off x="1638290" y="3586677"/>
+              <a:ext cx="157656" cy="157656"/>
+            </a:xfrm>
+            <a:prstGeom prst="ellipse">
+              <a:avLst/>
+            </a:prstGeom>
+            <a:solidFill>
+              <a:schemeClr val="bg1"/>
+            </a:solidFill>
+          </p:spPr>
+          <p:style>
+            <a:lnRef idx="2">
+              <a:schemeClr val="accent1">
+                <a:shade val="15000"/>
+              </a:schemeClr>
+            </a:lnRef>
+            <a:fillRef idx="1">
+              <a:schemeClr val="accent1"/>
+            </a:fillRef>
+            <a:effectRef idx="0">
+              <a:schemeClr val="accent1"/>
+            </a:effectRef>
+            <a:fontRef idx="minor">
+              <a:schemeClr val="lt1"/>
+            </a:fontRef>
+          </p:style>
+          <p:txBody>
+            <a:bodyPr rtlCol="0" anchor="ctr"/>
+            <a:lstStyle/>
+            <a:p>
+              <a:pPr algn="ctr"/>
+              <a:endParaRPr lang="en-US"/>
+            </a:p>
+          </p:txBody>
+        </p:sp>
+        <p:sp>
+          <p:nvSpPr>
+            <p:cNvPr id="23" name="Oval 22">
+              <a:extLst>
+                <a:ext uri="{FF2B5EF4-FFF2-40B4-BE49-F238E27FC236}">
+                  <a16:creationId xmlns:a16="http://schemas.microsoft.com/office/drawing/2014/main" id="{FE98A8D7-5C49-1BA9-3911-1B650A9E0655}"/>
+                </a:ext>
+              </a:extLst>
+            </p:cNvPr>
+            <p:cNvSpPr/>
+            <p:nvPr/>
+          </p:nvSpPr>
+          <p:spPr>
+            <a:xfrm>
+              <a:off x="1494290" y="3421077"/>
+              <a:ext cx="157656" cy="157656"/>
+            </a:xfrm>
+            <a:prstGeom prst="ellipse">
+              <a:avLst/>
+            </a:prstGeom>
+            <a:solidFill>
+              <a:schemeClr val="bg1"/>
+            </a:solidFill>
+          </p:spPr>
+          <p:style>
+            <a:lnRef idx="2">
+              <a:schemeClr val="accent1">
+                <a:shade val="15000"/>
+              </a:schemeClr>
+            </a:lnRef>
+            <a:fillRef idx="1">
+              <a:schemeClr val="accent1"/>
+            </a:fillRef>
+            <a:effectRef idx="0">
+              <a:schemeClr val="accent1"/>
+            </a:effectRef>
+            <a:fontRef idx="minor">
+              <a:schemeClr val="lt1"/>
+            </a:fontRef>
+          </p:style>
+          <p:txBody>
+            <a:bodyPr rtlCol="0" anchor="ctr"/>
+            <a:lstStyle/>
+            <a:p>
+              <a:pPr algn="ctr"/>
+              <a:endParaRPr lang="en-US"/>
+            </a:p>
+          </p:txBody>
+        </p:sp>
+        <p:sp>
+          <p:nvSpPr>
+            <p:cNvPr id="24" name="Oval 23">
+              <a:extLst>
+                <a:ext uri="{FF2B5EF4-FFF2-40B4-BE49-F238E27FC236}">
+                  <a16:creationId xmlns:a16="http://schemas.microsoft.com/office/drawing/2014/main" id="{60F0B621-4DAD-097C-43AE-174F72D93AFF}"/>
+                </a:ext>
+              </a:extLst>
+            </p:cNvPr>
+            <p:cNvSpPr/>
+            <p:nvPr/>
+          </p:nvSpPr>
+          <p:spPr>
+            <a:xfrm>
+              <a:off x="1796690" y="3334677"/>
+              <a:ext cx="157656" cy="157656"/>
+            </a:xfrm>
+            <a:prstGeom prst="ellipse">
+              <a:avLst/>
+            </a:prstGeom>
+            <a:solidFill>
+              <a:schemeClr val="bg1"/>
+            </a:solidFill>
+          </p:spPr>
+          <p:style>
+            <a:lnRef idx="2">
+              <a:schemeClr val="accent1">
+                <a:shade val="15000"/>
+              </a:schemeClr>
+            </a:lnRef>
+            <a:fillRef idx="1">
+              <a:schemeClr val="accent1"/>
+            </a:fillRef>
+            <a:effectRef idx="0">
+              <a:schemeClr val="accent1"/>
+            </a:effectRef>
+            <a:fontRef idx="minor">
+              <a:schemeClr val="lt1"/>
+            </a:fontRef>
+          </p:style>
+          <p:txBody>
+            <a:bodyPr rtlCol="0" anchor="ctr"/>
+            <a:lstStyle/>
+            <a:p>
+              <a:pPr algn="ctr"/>
+              <a:endParaRPr lang="en-US" dirty="0"/>
+            </a:p>
+          </p:txBody>
+        </p:sp>
+      </p:grpSp>
       <p:sp>
         <p:nvSpPr>
           <p:cNvPr id="4" name="TextBox 3">
@@ -3268,6 +4009,298 @@
     <p:extLst>
       <p:ext uri="{BB962C8B-B14F-4D97-AF65-F5344CB8AC3E}">
         <p14:creationId xmlns:p14="http://schemas.microsoft.com/office/powerpoint/2010/main" val="1578466601"/>
+      </p:ext>
+    </p:extLst>
+  </p:cSld>
+  <p:clrMapOvr>
+    <a:masterClrMapping/>
+  </p:clrMapOvr>
+</p:sld>
+</file>
+
+<file path=ppt/slides/slide10.xml><?xml version="1.0" encoding="utf-8"?>
+<p:sld xmlns:a="http://schemas.openxmlformats.org/drawingml/2006/main" xmlns:r="http://schemas.openxmlformats.org/officeDocument/2006/relationships" xmlns:p="http://schemas.openxmlformats.org/presentationml/2006/main">
+  <p:cSld>
+    <p:spTree>
+      <p:nvGrpSpPr>
+        <p:cNvPr id="1" name=""/>
+        <p:cNvGrpSpPr/>
+        <p:nvPr/>
+      </p:nvGrpSpPr>
+      <p:grpSpPr>
+        <a:xfrm>
+          <a:off x="0" y="0"/>
+          <a:ext cx="0" cy="0"/>
+          <a:chOff x="0" y="0"/>
+          <a:chExt cx="0" cy="0"/>
+        </a:xfrm>
+      </p:grpSpPr>
+      <p:pic>
+        <p:nvPicPr>
+          <p:cNvPr id="3" name="Picture 2" descr="A black and white image of a pair of glasses&#10;&#10;Description automatically generated">
+            <a:extLst>
+              <a:ext uri="{FF2B5EF4-FFF2-40B4-BE49-F238E27FC236}">
+                <a16:creationId xmlns:a16="http://schemas.microsoft.com/office/drawing/2014/main" id="{B684A4BF-FDC1-2894-0B7B-86E7558A8AF8}"/>
+              </a:ext>
+            </a:extLst>
+          </p:cNvPr>
+          <p:cNvPicPr>
+            <a:picLocks noChangeAspect="1"/>
+          </p:cNvPicPr>
+          <p:nvPr/>
+        </p:nvPicPr>
+        <p:blipFill>
+          <a:blip r:embed="rId2"/>
+          <a:stretch>
+            <a:fillRect/>
+          </a:stretch>
+        </p:blipFill>
+        <p:spPr>
+          <a:xfrm>
+            <a:off x="6326" y="-1"/>
+            <a:ext cx="6851674" cy="6864339"/>
+          </a:xfrm>
+          <a:prstGeom prst="rect">
+            <a:avLst/>
+          </a:prstGeom>
+        </p:spPr>
+      </p:pic>
+      <p:sp>
+        <p:nvSpPr>
+          <p:cNvPr id="4" name="TextBox 3">
+            <a:extLst>
+              <a:ext uri="{FF2B5EF4-FFF2-40B4-BE49-F238E27FC236}">
+                <a16:creationId xmlns:a16="http://schemas.microsoft.com/office/drawing/2014/main" id="{DD3DB050-444C-84A6-C3A6-814154162CBE}"/>
+              </a:ext>
+            </a:extLst>
+          </p:cNvPr>
+          <p:cNvSpPr txBox="1"/>
+          <p:nvPr/>
+        </p:nvSpPr>
+        <p:spPr>
+          <a:xfrm>
+            <a:off x="4514194" y="4247613"/>
+            <a:ext cx="1415772" cy="784830"/>
+          </a:xfrm>
+          <a:prstGeom prst="rect">
+            <a:avLst/>
+          </a:prstGeom>
+          <a:noFill/>
+        </p:spPr>
+        <p:txBody>
+          <a:bodyPr wrap="none" rtlCol="0">
+            <a:spAutoFit/>
+          </a:bodyPr>
+          <a:lstStyle/>
+          <a:p>
+            <a:r>
+              <a:rPr lang="en-US" sz="4500" b="1" dirty="0"/>
+              <a:t>LEFT</a:t>
+            </a:r>
+          </a:p>
+        </p:txBody>
+      </p:sp>
+      <p:sp>
+        <p:nvSpPr>
+          <p:cNvPr id="5" name="TextBox 4">
+            <a:extLst>
+              <a:ext uri="{FF2B5EF4-FFF2-40B4-BE49-F238E27FC236}">
+                <a16:creationId xmlns:a16="http://schemas.microsoft.com/office/drawing/2014/main" id="{D813841F-542C-3CF3-1843-60219AD7C89C}"/>
+              </a:ext>
+            </a:extLst>
+          </p:cNvPr>
+          <p:cNvSpPr txBox="1"/>
+          <p:nvPr/>
+        </p:nvSpPr>
+        <p:spPr>
+          <a:xfrm>
+            <a:off x="528640" y="4247613"/>
+            <a:ext cx="1845377" cy="784830"/>
+          </a:xfrm>
+          <a:prstGeom prst="rect">
+            <a:avLst/>
+          </a:prstGeom>
+          <a:noFill/>
+        </p:spPr>
+        <p:txBody>
+          <a:bodyPr wrap="none" rtlCol="0">
+            <a:spAutoFit/>
+          </a:bodyPr>
+          <a:lstStyle/>
+          <a:p>
+            <a:r>
+              <a:rPr lang="en-US" sz="4500" b="1" dirty="0"/>
+              <a:t>RIGHT</a:t>
+            </a:r>
+          </a:p>
+        </p:txBody>
+      </p:sp>
+      <p:sp>
+        <p:nvSpPr>
+          <p:cNvPr id="2" name="Down Arrow 1">
+            <a:extLst>
+              <a:ext uri="{FF2B5EF4-FFF2-40B4-BE49-F238E27FC236}">
+                <a16:creationId xmlns:a16="http://schemas.microsoft.com/office/drawing/2014/main" id="{F8C8567F-F1D2-AE4C-9417-A4337694C76B}"/>
+              </a:ext>
+            </a:extLst>
+          </p:cNvPr>
+          <p:cNvSpPr/>
+          <p:nvPr/>
+        </p:nvSpPr>
+        <p:spPr>
+          <a:xfrm>
+            <a:off x="881548" y="315310"/>
+            <a:ext cx="1492469" cy="1980232"/>
+          </a:xfrm>
+          <a:prstGeom prst="downArrow">
+            <a:avLst/>
+          </a:prstGeom>
+          <a:solidFill>
+            <a:schemeClr val="tx1"/>
+          </a:solidFill>
+        </p:spPr>
+        <p:style>
+          <a:lnRef idx="2">
+            <a:schemeClr val="accent1">
+              <a:shade val="15000"/>
+            </a:schemeClr>
+          </a:lnRef>
+          <a:fillRef idx="1">
+            <a:schemeClr val="accent1"/>
+          </a:fillRef>
+          <a:effectRef idx="0">
+            <a:schemeClr val="accent1"/>
+          </a:effectRef>
+          <a:fontRef idx="minor">
+            <a:schemeClr val="lt1"/>
+          </a:fontRef>
+        </p:style>
+        <p:txBody>
+          <a:bodyPr rtlCol="0" anchor="ctr"/>
+          <a:lstStyle/>
+          <a:p>
+            <a:pPr algn="ctr"/>
+            <a:endParaRPr lang="en-US"/>
+          </a:p>
+        </p:txBody>
+      </p:sp>
+      <p:cxnSp>
+        <p:nvCxnSpPr>
+          <p:cNvPr id="10" name="Straight Connector 9">
+            <a:extLst>
+              <a:ext uri="{FF2B5EF4-FFF2-40B4-BE49-F238E27FC236}">
+                <a16:creationId xmlns:a16="http://schemas.microsoft.com/office/drawing/2014/main" id="{84BD5686-3C75-30D0-6175-82F4CCE2A4D0}"/>
+              </a:ext>
+            </a:extLst>
+          </p:cNvPr>
+          <p:cNvCxnSpPr>
+            <a:cxnSpLocks/>
+          </p:cNvCxnSpPr>
+          <p:nvPr/>
+        </p:nvCxnSpPr>
+        <p:spPr>
+          <a:xfrm>
+            <a:off x="1200807" y="5966241"/>
+            <a:ext cx="2635469" cy="0"/>
+          </a:xfrm>
+          <a:prstGeom prst="line">
+            <a:avLst/>
+          </a:prstGeom>
+          <a:ln w="82550">
+            <a:solidFill>
+              <a:schemeClr val="tx1"/>
+            </a:solidFill>
+            <a:headEnd type="none"/>
+            <a:tailEnd type="triangle"/>
+          </a:ln>
+        </p:spPr>
+        <p:style>
+          <a:lnRef idx="2">
+            <a:schemeClr val="accent1"/>
+          </a:lnRef>
+          <a:fillRef idx="0">
+            <a:schemeClr val="accent1"/>
+          </a:fillRef>
+          <a:effectRef idx="1">
+            <a:schemeClr val="accent1"/>
+          </a:effectRef>
+          <a:fontRef idx="minor">
+            <a:schemeClr val="tx1"/>
+          </a:fontRef>
+        </p:style>
+      </p:cxnSp>
+      <p:sp>
+        <p:nvSpPr>
+          <p:cNvPr id="11" name="TextBox 10">
+            <a:extLst>
+              <a:ext uri="{FF2B5EF4-FFF2-40B4-BE49-F238E27FC236}">
+                <a16:creationId xmlns:a16="http://schemas.microsoft.com/office/drawing/2014/main" id="{2DEB142F-A586-A663-4BEB-91A210113B2A}"/>
+              </a:ext>
+            </a:extLst>
+          </p:cNvPr>
+          <p:cNvSpPr txBox="1"/>
+          <p:nvPr/>
+        </p:nvSpPr>
+        <p:spPr>
+          <a:xfrm>
+            <a:off x="1606097" y="5573826"/>
+            <a:ext cx="1911101" cy="784830"/>
+          </a:xfrm>
+          <a:prstGeom prst="rect">
+            <a:avLst/>
+          </a:prstGeom>
+          <a:solidFill>
+            <a:srgbClr val="FFF7EC"/>
+          </a:solidFill>
+        </p:spPr>
+        <p:txBody>
+          <a:bodyPr wrap="none" rtlCol="0">
+            <a:spAutoFit/>
+          </a:bodyPr>
+          <a:lstStyle/>
+          <a:p>
+            <a:pPr algn="ctr"/>
+            <a:r>
+              <a:rPr lang="en-US" sz="4500" b="1" dirty="0"/>
+              <a:t>0.40 m</a:t>
+            </a:r>
+          </a:p>
+        </p:txBody>
+      </p:sp>
+      <p:pic>
+        <p:nvPicPr>
+          <p:cNvPr id="12" name="Picture 11">
+            <a:extLst>
+              <a:ext uri="{FF2B5EF4-FFF2-40B4-BE49-F238E27FC236}">
+                <a16:creationId xmlns:a16="http://schemas.microsoft.com/office/drawing/2014/main" id="{8F0AC390-22CF-3906-B38D-B270FE406B6E}"/>
+              </a:ext>
+            </a:extLst>
+          </p:cNvPr>
+          <p:cNvPicPr>
+            <a:picLocks noChangeAspect="1"/>
+          </p:cNvPicPr>
+          <p:nvPr/>
+        </p:nvPicPr>
+        <p:blipFill>
+          <a:blip r:embed="rId3"/>
+          <a:stretch>
+            <a:fillRect/>
+          </a:stretch>
+        </p:blipFill>
+        <p:spPr>
+          <a:xfrm>
+            <a:off x="199776" y="5464694"/>
+            <a:ext cx="1034115" cy="1263650"/>
+          </a:xfrm>
+          <a:prstGeom prst="rect">
+            <a:avLst/>
+          </a:prstGeom>
+        </p:spPr>
+      </p:pic>
+    </p:spTree>
+    <p:extLst>
+      <p:ext uri="{BB962C8B-B14F-4D97-AF65-F5344CB8AC3E}">
+        <p14:creationId xmlns:p14="http://schemas.microsoft.com/office/powerpoint/2010/main" val="3195913424"/>
       </p:ext>
     </p:extLst>
   </p:cSld>
@@ -3296,32 +4329,25 @@
       </p:grpSpPr>
       <p:pic>
         <p:nvPicPr>
-          <p:cNvPr id="1026" name="Picture 2" descr="Create a simple clipart illustration of a pair of eyes. The design should be minimalist, using clean lines and limited color to convey the shape and expression of the eyes in a stylized manner. This clipart should be straightforward, focusing on the essential features of the eyes without intricate details, suitable for use in various graphic design contexts where simplicity and clarity are key.">
+          <p:cNvPr id="42" name="Picture 41" descr="A drawing of a eye&#10;&#10;Description automatically generated">
             <a:extLst>
               <a:ext uri="{FF2B5EF4-FFF2-40B4-BE49-F238E27FC236}">
-                <a16:creationId xmlns:a16="http://schemas.microsoft.com/office/drawing/2014/main" id="{C304A54A-5FAF-4BAA-206F-51FC8660B9C7}"/>
+                <a16:creationId xmlns:a16="http://schemas.microsoft.com/office/drawing/2014/main" id="{D25D9650-CC51-4D37-C8B7-4BC67A897A64}"/>
               </a:ext>
             </a:extLst>
           </p:cNvPr>
           <p:cNvPicPr>
-            <a:picLocks noChangeAspect="1" noChangeArrowheads="1"/>
+            <a:picLocks noChangeAspect="1"/>
           </p:cNvPicPr>
           <p:nvPr/>
         </p:nvPicPr>
         <p:blipFill>
-          <a:blip r:embed="rId2">
-            <a:extLst>
-              <a:ext uri="{28A0092B-C50C-407E-A947-70E740481C1C}">
-                <a14:useLocalDpi xmlns:a14="http://schemas.microsoft.com/office/drawing/2010/main" val="0"/>
-              </a:ext>
-            </a:extLst>
-          </a:blip>
-          <a:srcRect/>
+          <a:blip r:embed="rId2"/>
           <a:stretch>
             <a:fillRect/>
           </a:stretch>
         </p:blipFill>
-        <p:spPr bwMode="auto">
+        <p:spPr>
           <a:xfrm>
             <a:off x="0" y="0"/>
             <a:ext cx="6858000" cy="6858000"/>
@@ -3329,16 +4355,6 @@
           <a:prstGeom prst="rect">
             <a:avLst/>
           </a:prstGeom>
-          <a:noFill/>
-          <a:extLst>
-            <a:ext uri="{909E8E84-426E-40DD-AFC4-6F175D3DCCD1}">
-              <a14:hiddenFill xmlns:a14="http://schemas.microsoft.com/office/drawing/2010/main">
-                <a:solidFill>
-                  <a:srgbClr val="FFFFFF"/>
-                </a:solidFill>
-              </a14:hiddenFill>
-            </a:ext>
-          </a:extLst>
         </p:spPr>
       </p:pic>
       <p:sp>
@@ -3578,6 +4594,762 @@
           </a:prstGeom>
         </p:spPr>
       </p:pic>
+      <p:grpSp>
+        <p:nvGrpSpPr>
+          <p:cNvPr id="40" name="Group 39">
+            <a:extLst>
+              <a:ext uri="{FF2B5EF4-FFF2-40B4-BE49-F238E27FC236}">
+                <a16:creationId xmlns:a16="http://schemas.microsoft.com/office/drawing/2014/main" id="{BCF90EAB-38EB-9CFC-7BCD-276D99AD1141}"/>
+              </a:ext>
+            </a:extLst>
+          </p:cNvPr>
+          <p:cNvGrpSpPr/>
+          <p:nvPr/>
+        </p:nvGrpSpPr>
+        <p:grpSpPr>
+          <a:xfrm>
+            <a:off x="940099" y="2399416"/>
+            <a:ext cx="1870838" cy="1870838"/>
+            <a:chOff x="940099" y="2485286"/>
+            <a:chExt cx="1870838" cy="1870838"/>
+          </a:xfrm>
+        </p:grpSpPr>
+        <p:sp>
+          <p:nvSpPr>
+            <p:cNvPr id="39" name="Oval 38">
+              <a:extLst>
+                <a:ext uri="{FF2B5EF4-FFF2-40B4-BE49-F238E27FC236}">
+                  <a16:creationId xmlns:a16="http://schemas.microsoft.com/office/drawing/2014/main" id="{82D7322B-56C7-24D6-EED6-7258DCEAD10E}"/>
+                </a:ext>
+              </a:extLst>
+            </p:cNvPr>
+            <p:cNvSpPr/>
+            <p:nvPr/>
+          </p:nvSpPr>
+          <p:spPr>
+            <a:xfrm>
+              <a:off x="940099" y="2485286"/>
+              <a:ext cx="1870838" cy="1870838"/>
+            </a:xfrm>
+            <a:prstGeom prst="ellipse">
+              <a:avLst/>
+            </a:prstGeom>
+            <a:solidFill>
+              <a:srgbClr val="062438"/>
+            </a:solidFill>
+          </p:spPr>
+          <p:style>
+            <a:lnRef idx="2">
+              <a:schemeClr val="accent1">
+                <a:shade val="15000"/>
+              </a:schemeClr>
+            </a:lnRef>
+            <a:fillRef idx="1">
+              <a:schemeClr val="accent1"/>
+            </a:fillRef>
+            <a:effectRef idx="0">
+              <a:schemeClr val="accent1"/>
+            </a:effectRef>
+            <a:fontRef idx="minor">
+              <a:schemeClr val="lt1"/>
+            </a:fontRef>
+          </p:style>
+          <p:txBody>
+            <a:bodyPr rtlCol="0" anchor="ctr"/>
+            <a:lstStyle/>
+            <a:p>
+              <a:pPr algn="ctr"/>
+              <a:endParaRPr lang="en-US" dirty="0"/>
+            </a:p>
+          </p:txBody>
+        </p:sp>
+        <p:sp>
+          <p:nvSpPr>
+            <p:cNvPr id="25" name="Oval 24">
+              <a:extLst>
+                <a:ext uri="{FF2B5EF4-FFF2-40B4-BE49-F238E27FC236}">
+                  <a16:creationId xmlns:a16="http://schemas.microsoft.com/office/drawing/2014/main" id="{BA7E2ABB-3CC6-C249-DBFA-83BE29F0F604}"/>
+                </a:ext>
+              </a:extLst>
+            </p:cNvPr>
+            <p:cNvSpPr/>
+            <p:nvPr/>
+          </p:nvSpPr>
+          <p:spPr>
+            <a:xfrm>
+              <a:off x="1818290" y="2737077"/>
+              <a:ext cx="157656" cy="157656"/>
+            </a:xfrm>
+            <a:prstGeom prst="ellipse">
+              <a:avLst/>
+            </a:prstGeom>
+            <a:solidFill>
+              <a:schemeClr val="bg1"/>
+            </a:solidFill>
+          </p:spPr>
+          <p:style>
+            <a:lnRef idx="2">
+              <a:schemeClr val="accent1">
+                <a:shade val="15000"/>
+              </a:schemeClr>
+            </a:lnRef>
+            <a:fillRef idx="1">
+              <a:schemeClr val="accent1"/>
+            </a:fillRef>
+            <a:effectRef idx="0">
+              <a:schemeClr val="accent1"/>
+            </a:effectRef>
+            <a:fontRef idx="minor">
+              <a:schemeClr val="lt1"/>
+            </a:fontRef>
+          </p:style>
+          <p:txBody>
+            <a:bodyPr rtlCol="0" anchor="ctr"/>
+            <a:lstStyle/>
+            <a:p>
+              <a:pPr algn="ctr"/>
+              <a:endParaRPr lang="en-US"/>
+            </a:p>
+          </p:txBody>
+        </p:sp>
+        <p:sp>
+          <p:nvSpPr>
+            <p:cNvPr id="26" name="Oval 25">
+              <a:extLst>
+                <a:ext uri="{FF2B5EF4-FFF2-40B4-BE49-F238E27FC236}">
+                  <a16:creationId xmlns:a16="http://schemas.microsoft.com/office/drawing/2014/main" id="{312CA18E-AF4F-788B-F22C-B8BAA679716F}"/>
+                </a:ext>
+              </a:extLst>
+            </p:cNvPr>
+            <p:cNvSpPr/>
+            <p:nvPr/>
+          </p:nvSpPr>
+          <p:spPr>
+            <a:xfrm>
+              <a:off x="2372690" y="3183477"/>
+              <a:ext cx="157656" cy="157656"/>
+            </a:xfrm>
+            <a:prstGeom prst="ellipse">
+              <a:avLst/>
+            </a:prstGeom>
+            <a:solidFill>
+              <a:schemeClr val="bg1"/>
+            </a:solidFill>
+          </p:spPr>
+          <p:style>
+            <a:lnRef idx="2">
+              <a:schemeClr val="accent1">
+                <a:shade val="15000"/>
+              </a:schemeClr>
+            </a:lnRef>
+            <a:fillRef idx="1">
+              <a:schemeClr val="accent1"/>
+            </a:fillRef>
+            <a:effectRef idx="0">
+              <a:schemeClr val="accent1"/>
+            </a:effectRef>
+            <a:fontRef idx="minor">
+              <a:schemeClr val="lt1"/>
+            </a:fontRef>
+          </p:style>
+          <p:txBody>
+            <a:bodyPr rtlCol="0" anchor="ctr"/>
+            <a:lstStyle/>
+            <a:p>
+              <a:pPr algn="ctr"/>
+              <a:endParaRPr lang="en-US"/>
+            </a:p>
+          </p:txBody>
+        </p:sp>
+        <p:sp>
+          <p:nvSpPr>
+            <p:cNvPr id="27" name="Oval 26">
+              <a:extLst>
+                <a:ext uri="{FF2B5EF4-FFF2-40B4-BE49-F238E27FC236}">
+                  <a16:creationId xmlns:a16="http://schemas.microsoft.com/office/drawing/2014/main" id="{5563C1CB-9559-BD53-9165-DAF3900C0184}"/>
+                </a:ext>
+              </a:extLst>
+            </p:cNvPr>
+            <p:cNvSpPr/>
+            <p:nvPr/>
+          </p:nvSpPr>
+          <p:spPr>
+            <a:xfrm>
+              <a:off x="2127890" y="3845877"/>
+              <a:ext cx="157656" cy="157656"/>
+            </a:xfrm>
+            <a:prstGeom prst="ellipse">
+              <a:avLst/>
+            </a:prstGeom>
+            <a:solidFill>
+              <a:schemeClr val="bg1"/>
+            </a:solidFill>
+          </p:spPr>
+          <p:style>
+            <a:lnRef idx="2">
+              <a:schemeClr val="accent1">
+                <a:shade val="15000"/>
+              </a:schemeClr>
+            </a:lnRef>
+            <a:fillRef idx="1">
+              <a:schemeClr val="accent1"/>
+            </a:fillRef>
+            <a:effectRef idx="0">
+              <a:schemeClr val="accent1"/>
+            </a:effectRef>
+            <a:fontRef idx="minor">
+              <a:schemeClr val="lt1"/>
+            </a:fontRef>
+          </p:style>
+          <p:txBody>
+            <a:bodyPr rtlCol="0" anchor="ctr"/>
+            <a:lstStyle/>
+            <a:p>
+              <a:pPr algn="ctr"/>
+              <a:endParaRPr lang="en-US"/>
+            </a:p>
+          </p:txBody>
+        </p:sp>
+        <p:sp>
+          <p:nvSpPr>
+            <p:cNvPr id="28" name="Oval 27">
+              <a:extLst>
+                <a:ext uri="{FF2B5EF4-FFF2-40B4-BE49-F238E27FC236}">
+                  <a16:creationId xmlns:a16="http://schemas.microsoft.com/office/drawing/2014/main" id="{0DF99F16-B961-35BC-5523-83C34F33B500}"/>
+                </a:ext>
+              </a:extLst>
+            </p:cNvPr>
+            <p:cNvSpPr/>
+            <p:nvPr/>
+          </p:nvSpPr>
+          <p:spPr>
+            <a:xfrm>
+              <a:off x="1422290" y="3817077"/>
+              <a:ext cx="157656" cy="157656"/>
+            </a:xfrm>
+            <a:prstGeom prst="ellipse">
+              <a:avLst/>
+            </a:prstGeom>
+            <a:solidFill>
+              <a:schemeClr val="bg1"/>
+            </a:solidFill>
+          </p:spPr>
+          <p:style>
+            <a:lnRef idx="2">
+              <a:schemeClr val="accent1">
+                <a:shade val="15000"/>
+              </a:schemeClr>
+            </a:lnRef>
+            <a:fillRef idx="1">
+              <a:schemeClr val="accent1"/>
+            </a:fillRef>
+            <a:effectRef idx="0">
+              <a:schemeClr val="accent1"/>
+            </a:effectRef>
+            <a:fontRef idx="minor">
+              <a:schemeClr val="lt1"/>
+            </a:fontRef>
+          </p:style>
+          <p:txBody>
+            <a:bodyPr rtlCol="0" anchor="ctr"/>
+            <a:lstStyle/>
+            <a:p>
+              <a:pPr algn="ctr"/>
+              <a:endParaRPr lang="en-US"/>
+            </a:p>
+          </p:txBody>
+        </p:sp>
+        <p:sp>
+          <p:nvSpPr>
+            <p:cNvPr id="29" name="Oval 28">
+              <a:extLst>
+                <a:ext uri="{FF2B5EF4-FFF2-40B4-BE49-F238E27FC236}">
+                  <a16:creationId xmlns:a16="http://schemas.microsoft.com/office/drawing/2014/main" id="{D099F480-C9FC-127D-D45B-7BCE8B9C93E0}"/>
+                </a:ext>
+              </a:extLst>
+            </p:cNvPr>
+            <p:cNvSpPr/>
+            <p:nvPr/>
+          </p:nvSpPr>
+          <p:spPr>
+            <a:xfrm>
+              <a:off x="1220690" y="3125877"/>
+              <a:ext cx="157656" cy="157656"/>
+            </a:xfrm>
+            <a:prstGeom prst="ellipse">
+              <a:avLst/>
+            </a:prstGeom>
+            <a:solidFill>
+              <a:schemeClr val="bg1"/>
+            </a:solidFill>
+          </p:spPr>
+          <p:style>
+            <a:lnRef idx="2">
+              <a:schemeClr val="accent1">
+                <a:shade val="15000"/>
+              </a:schemeClr>
+            </a:lnRef>
+            <a:fillRef idx="1">
+              <a:schemeClr val="accent1"/>
+            </a:fillRef>
+            <a:effectRef idx="0">
+              <a:schemeClr val="accent1"/>
+            </a:effectRef>
+            <a:fontRef idx="minor">
+              <a:schemeClr val="lt1"/>
+            </a:fontRef>
+          </p:style>
+          <p:txBody>
+            <a:bodyPr rtlCol="0" anchor="ctr"/>
+            <a:lstStyle/>
+            <a:p>
+              <a:pPr algn="ctr"/>
+              <a:endParaRPr lang="en-US"/>
+            </a:p>
+          </p:txBody>
+        </p:sp>
+        <p:sp>
+          <p:nvSpPr>
+            <p:cNvPr id="30" name="Oval 29">
+              <a:extLst>
+                <a:ext uri="{FF2B5EF4-FFF2-40B4-BE49-F238E27FC236}">
+                  <a16:creationId xmlns:a16="http://schemas.microsoft.com/office/drawing/2014/main" id="{47F61F59-59C3-2D99-BBBB-13617B39FFA7}"/>
+                </a:ext>
+              </a:extLst>
+            </p:cNvPr>
+            <p:cNvSpPr/>
+            <p:nvPr/>
+          </p:nvSpPr>
+          <p:spPr>
+            <a:xfrm>
+              <a:off x="1523090" y="3183477"/>
+              <a:ext cx="157656" cy="157656"/>
+            </a:xfrm>
+            <a:prstGeom prst="ellipse">
+              <a:avLst/>
+            </a:prstGeom>
+            <a:solidFill>
+              <a:schemeClr val="bg1"/>
+            </a:solidFill>
+          </p:spPr>
+          <p:style>
+            <a:lnRef idx="2">
+              <a:schemeClr val="accent1">
+                <a:shade val="15000"/>
+              </a:schemeClr>
+            </a:lnRef>
+            <a:fillRef idx="1">
+              <a:schemeClr val="accent1"/>
+            </a:fillRef>
+            <a:effectRef idx="0">
+              <a:schemeClr val="accent1"/>
+            </a:effectRef>
+            <a:fontRef idx="minor">
+              <a:schemeClr val="lt1"/>
+            </a:fontRef>
+          </p:style>
+          <p:txBody>
+            <a:bodyPr rtlCol="0" anchor="ctr"/>
+            <a:lstStyle/>
+            <a:p>
+              <a:pPr algn="ctr"/>
+              <a:endParaRPr lang="en-US"/>
+            </a:p>
+          </p:txBody>
+        </p:sp>
+        <p:sp>
+          <p:nvSpPr>
+            <p:cNvPr id="31" name="Oval 30">
+              <a:extLst>
+                <a:ext uri="{FF2B5EF4-FFF2-40B4-BE49-F238E27FC236}">
+                  <a16:creationId xmlns:a16="http://schemas.microsoft.com/office/drawing/2014/main" id="{5370ACD2-7E36-0825-DF8D-F64372173BB7}"/>
+                </a:ext>
+              </a:extLst>
+            </p:cNvPr>
+            <p:cNvSpPr/>
+            <p:nvPr/>
+          </p:nvSpPr>
+          <p:spPr>
+            <a:xfrm>
+              <a:off x="1703090" y="3046677"/>
+              <a:ext cx="157656" cy="157656"/>
+            </a:xfrm>
+            <a:prstGeom prst="ellipse">
+              <a:avLst/>
+            </a:prstGeom>
+            <a:solidFill>
+              <a:schemeClr val="bg1"/>
+            </a:solidFill>
+          </p:spPr>
+          <p:style>
+            <a:lnRef idx="2">
+              <a:schemeClr val="accent1">
+                <a:shade val="15000"/>
+              </a:schemeClr>
+            </a:lnRef>
+            <a:fillRef idx="1">
+              <a:schemeClr val="accent1"/>
+            </a:fillRef>
+            <a:effectRef idx="0">
+              <a:schemeClr val="accent1"/>
+            </a:effectRef>
+            <a:fontRef idx="minor">
+              <a:schemeClr val="lt1"/>
+            </a:fontRef>
+          </p:style>
+          <p:txBody>
+            <a:bodyPr rtlCol="0" anchor="ctr"/>
+            <a:lstStyle/>
+            <a:p>
+              <a:pPr algn="ctr"/>
+              <a:endParaRPr lang="en-US"/>
+            </a:p>
+          </p:txBody>
+        </p:sp>
+        <p:sp>
+          <p:nvSpPr>
+            <p:cNvPr id="32" name="Oval 31">
+              <a:extLst>
+                <a:ext uri="{FF2B5EF4-FFF2-40B4-BE49-F238E27FC236}">
+                  <a16:creationId xmlns:a16="http://schemas.microsoft.com/office/drawing/2014/main" id="{6AB0F291-3517-892F-6CC1-6623F4BFBF13}"/>
+                </a:ext>
+              </a:extLst>
+            </p:cNvPr>
+            <p:cNvSpPr/>
+            <p:nvPr/>
+          </p:nvSpPr>
+          <p:spPr>
+            <a:xfrm>
+              <a:off x="1926290" y="3075477"/>
+              <a:ext cx="157656" cy="157656"/>
+            </a:xfrm>
+            <a:prstGeom prst="ellipse">
+              <a:avLst/>
+            </a:prstGeom>
+            <a:solidFill>
+              <a:schemeClr val="bg1"/>
+            </a:solidFill>
+          </p:spPr>
+          <p:style>
+            <a:lnRef idx="2">
+              <a:schemeClr val="accent1">
+                <a:shade val="15000"/>
+              </a:schemeClr>
+            </a:lnRef>
+            <a:fillRef idx="1">
+              <a:schemeClr val="accent1"/>
+            </a:fillRef>
+            <a:effectRef idx="0">
+              <a:schemeClr val="accent1"/>
+            </a:effectRef>
+            <a:fontRef idx="minor">
+              <a:schemeClr val="lt1"/>
+            </a:fontRef>
+          </p:style>
+          <p:txBody>
+            <a:bodyPr rtlCol="0" anchor="ctr"/>
+            <a:lstStyle/>
+            <a:p>
+              <a:pPr algn="ctr"/>
+              <a:endParaRPr lang="en-US"/>
+            </a:p>
+          </p:txBody>
+        </p:sp>
+        <p:sp>
+          <p:nvSpPr>
+            <p:cNvPr id="33" name="Oval 32">
+              <a:extLst>
+                <a:ext uri="{FF2B5EF4-FFF2-40B4-BE49-F238E27FC236}">
+                  <a16:creationId xmlns:a16="http://schemas.microsoft.com/office/drawing/2014/main" id="{521157F1-EC2D-3446-23AC-1A81B670BD69}"/>
+                </a:ext>
+              </a:extLst>
+            </p:cNvPr>
+            <p:cNvSpPr/>
+            <p:nvPr/>
+          </p:nvSpPr>
+          <p:spPr>
+            <a:xfrm>
+              <a:off x="2077490" y="3255477"/>
+              <a:ext cx="157656" cy="157656"/>
+            </a:xfrm>
+            <a:prstGeom prst="ellipse">
+              <a:avLst/>
+            </a:prstGeom>
+            <a:solidFill>
+              <a:schemeClr val="bg1"/>
+            </a:solidFill>
+          </p:spPr>
+          <p:style>
+            <a:lnRef idx="2">
+              <a:schemeClr val="accent1">
+                <a:shade val="15000"/>
+              </a:schemeClr>
+            </a:lnRef>
+            <a:fillRef idx="1">
+              <a:schemeClr val="accent1"/>
+            </a:fillRef>
+            <a:effectRef idx="0">
+              <a:schemeClr val="accent1"/>
+            </a:effectRef>
+            <a:fontRef idx="minor">
+              <a:schemeClr val="lt1"/>
+            </a:fontRef>
+          </p:style>
+          <p:txBody>
+            <a:bodyPr rtlCol="0" anchor="ctr"/>
+            <a:lstStyle/>
+            <a:p>
+              <a:pPr algn="ctr"/>
+              <a:endParaRPr lang="en-US"/>
+            </a:p>
+          </p:txBody>
+        </p:sp>
+        <p:sp>
+          <p:nvSpPr>
+            <p:cNvPr id="34" name="Oval 33">
+              <a:extLst>
+                <a:ext uri="{FF2B5EF4-FFF2-40B4-BE49-F238E27FC236}">
+                  <a16:creationId xmlns:a16="http://schemas.microsoft.com/office/drawing/2014/main" id="{3ADE6057-166A-C8FA-36EA-80D97411215A}"/>
+                </a:ext>
+              </a:extLst>
+            </p:cNvPr>
+            <p:cNvSpPr/>
+            <p:nvPr/>
+          </p:nvSpPr>
+          <p:spPr>
+            <a:xfrm>
+              <a:off x="2063090" y="3478677"/>
+              <a:ext cx="157656" cy="157656"/>
+            </a:xfrm>
+            <a:prstGeom prst="ellipse">
+              <a:avLst/>
+            </a:prstGeom>
+            <a:solidFill>
+              <a:schemeClr val="bg1"/>
+            </a:solidFill>
+          </p:spPr>
+          <p:style>
+            <a:lnRef idx="2">
+              <a:schemeClr val="accent1">
+                <a:shade val="15000"/>
+              </a:schemeClr>
+            </a:lnRef>
+            <a:fillRef idx="1">
+              <a:schemeClr val="accent1"/>
+            </a:fillRef>
+            <a:effectRef idx="0">
+              <a:schemeClr val="accent1"/>
+            </a:effectRef>
+            <a:fontRef idx="minor">
+              <a:schemeClr val="lt1"/>
+            </a:fontRef>
+          </p:style>
+          <p:txBody>
+            <a:bodyPr rtlCol="0" anchor="ctr"/>
+            <a:lstStyle/>
+            <a:p>
+              <a:pPr algn="ctr"/>
+              <a:endParaRPr lang="en-US"/>
+            </a:p>
+          </p:txBody>
+        </p:sp>
+        <p:sp>
+          <p:nvSpPr>
+            <p:cNvPr id="35" name="Oval 34">
+              <a:extLst>
+                <a:ext uri="{FF2B5EF4-FFF2-40B4-BE49-F238E27FC236}">
+                  <a16:creationId xmlns:a16="http://schemas.microsoft.com/office/drawing/2014/main" id="{5D02300C-746D-448A-07ED-7FDA1B2695FE}"/>
+                </a:ext>
+              </a:extLst>
+            </p:cNvPr>
+            <p:cNvSpPr/>
+            <p:nvPr/>
+          </p:nvSpPr>
+          <p:spPr>
+            <a:xfrm>
+              <a:off x="1875890" y="3629877"/>
+              <a:ext cx="157656" cy="157656"/>
+            </a:xfrm>
+            <a:prstGeom prst="ellipse">
+              <a:avLst/>
+            </a:prstGeom>
+            <a:solidFill>
+              <a:schemeClr val="bg1"/>
+            </a:solidFill>
+          </p:spPr>
+          <p:style>
+            <a:lnRef idx="2">
+              <a:schemeClr val="accent1">
+                <a:shade val="15000"/>
+              </a:schemeClr>
+            </a:lnRef>
+            <a:fillRef idx="1">
+              <a:schemeClr val="accent1"/>
+            </a:fillRef>
+            <a:effectRef idx="0">
+              <a:schemeClr val="accent1"/>
+            </a:effectRef>
+            <a:fontRef idx="minor">
+              <a:schemeClr val="lt1"/>
+            </a:fontRef>
+          </p:style>
+          <p:txBody>
+            <a:bodyPr rtlCol="0" anchor="ctr"/>
+            <a:lstStyle/>
+            <a:p>
+              <a:pPr algn="ctr"/>
+              <a:endParaRPr lang="en-US"/>
+            </a:p>
+          </p:txBody>
+        </p:sp>
+        <p:sp>
+          <p:nvSpPr>
+            <p:cNvPr id="36" name="Oval 35">
+              <a:extLst>
+                <a:ext uri="{FF2B5EF4-FFF2-40B4-BE49-F238E27FC236}">
+                  <a16:creationId xmlns:a16="http://schemas.microsoft.com/office/drawing/2014/main" id="{F31AA593-111F-2834-F9C9-0E4C9B3EF7F2}"/>
+                </a:ext>
+              </a:extLst>
+            </p:cNvPr>
+            <p:cNvSpPr/>
+            <p:nvPr/>
+          </p:nvSpPr>
+          <p:spPr>
+            <a:xfrm>
+              <a:off x="1638290" y="3586677"/>
+              <a:ext cx="157656" cy="157656"/>
+            </a:xfrm>
+            <a:prstGeom prst="ellipse">
+              <a:avLst/>
+            </a:prstGeom>
+            <a:solidFill>
+              <a:schemeClr val="bg1"/>
+            </a:solidFill>
+          </p:spPr>
+          <p:style>
+            <a:lnRef idx="2">
+              <a:schemeClr val="accent1">
+                <a:shade val="15000"/>
+              </a:schemeClr>
+            </a:lnRef>
+            <a:fillRef idx="1">
+              <a:schemeClr val="accent1"/>
+            </a:fillRef>
+            <a:effectRef idx="0">
+              <a:schemeClr val="accent1"/>
+            </a:effectRef>
+            <a:fontRef idx="minor">
+              <a:schemeClr val="lt1"/>
+            </a:fontRef>
+          </p:style>
+          <p:txBody>
+            <a:bodyPr rtlCol="0" anchor="ctr"/>
+            <a:lstStyle/>
+            <a:p>
+              <a:pPr algn="ctr"/>
+              <a:endParaRPr lang="en-US"/>
+            </a:p>
+          </p:txBody>
+        </p:sp>
+        <p:sp>
+          <p:nvSpPr>
+            <p:cNvPr id="37" name="Oval 36">
+              <a:extLst>
+                <a:ext uri="{FF2B5EF4-FFF2-40B4-BE49-F238E27FC236}">
+                  <a16:creationId xmlns:a16="http://schemas.microsoft.com/office/drawing/2014/main" id="{AA5D9BB5-BDB3-DEE6-3323-22FF2EE95E7E}"/>
+                </a:ext>
+              </a:extLst>
+            </p:cNvPr>
+            <p:cNvSpPr/>
+            <p:nvPr/>
+          </p:nvSpPr>
+          <p:spPr>
+            <a:xfrm>
+              <a:off x="1494290" y="3421077"/>
+              <a:ext cx="157656" cy="157656"/>
+            </a:xfrm>
+            <a:prstGeom prst="ellipse">
+              <a:avLst/>
+            </a:prstGeom>
+            <a:solidFill>
+              <a:schemeClr val="bg1"/>
+            </a:solidFill>
+          </p:spPr>
+          <p:style>
+            <a:lnRef idx="2">
+              <a:schemeClr val="accent1">
+                <a:shade val="15000"/>
+              </a:schemeClr>
+            </a:lnRef>
+            <a:fillRef idx="1">
+              <a:schemeClr val="accent1"/>
+            </a:fillRef>
+            <a:effectRef idx="0">
+              <a:schemeClr val="accent1"/>
+            </a:effectRef>
+            <a:fontRef idx="minor">
+              <a:schemeClr val="lt1"/>
+            </a:fontRef>
+          </p:style>
+          <p:txBody>
+            <a:bodyPr rtlCol="0" anchor="ctr"/>
+            <a:lstStyle/>
+            <a:p>
+              <a:pPr algn="ctr"/>
+              <a:endParaRPr lang="en-US"/>
+            </a:p>
+          </p:txBody>
+        </p:sp>
+        <p:sp>
+          <p:nvSpPr>
+            <p:cNvPr id="38" name="Oval 37">
+              <a:extLst>
+                <a:ext uri="{FF2B5EF4-FFF2-40B4-BE49-F238E27FC236}">
+                  <a16:creationId xmlns:a16="http://schemas.microsoft.com/office/drawing/2014/main" id="{32CF61FA-04B7-859D-9362-C5DC689FB72A}"/>
+                </a:ext>
+              </a:extLst>
+            </p:cNvPr>
+            <p:cNvSpPr/>
+            <p:nvPr/>
+          </p:nvSpPr>
+          <p:spPr>
+            <a:xfrm>
+              <a:off x="1796690" y="3334677"/>
+              <a:ext cx="157656" cy="157656"/>
+            </a:xfrm>
+            <a:prstGeom prst="ellipse">
+              <a:avLst/>
+            </a:prstGeom>
+            <a:solidFill>
+              <a:schemeClr val="bg1"/>
+            </a:solidFill>
+          </p:spPr>
+          <p:style>
+            <a:lnRef idx="2">
+              <a:schemeClr val="accent1">
+                <a:shade val="15000"/>
+              </a:schemeClr>
+            </a:lnRef>
+            <a:fillRef idx="1">
+              <a:schemeClr val="accent1"/>
+            </a:fillRef>
+            <a:effectRef idx="0">
+              <a:schemeClr val="accent1"/>
+            </a:effectRef>
+            <a:fontRef idx="minor">
+              <a:schemeClr val="lt1"/>
+            </a:fontRef>
+          </p:style>
+          <p:txBody>
+            <a:bodyPr rtlCol="0" anchor="ctr"/>
+            <a:lstStyle/>
+            <a:p>
+              <a:pPr algn="ctr"/>
+              <a:endParaRPr lang="en-US" dirty="0"/>
+            </a:p>
+          </p:txBody>
+        </p:sp>
+      </p:grpSp>
     </p:spTree>
     <p:extLst>
       <p:ext uri="{BB962C8B-B14F-4D97-AF65-F5344CB8AC3E}">
@@ -3610,49 +5382,32 @@
       </p:grpSpPr>
       <p:pic>
         <p:nvPicPr>
-          <p:cNvPr id="2050" name="Picture 2" descr="Create a simple clipart illustration of a pair of glasses. The design should be minimalist, using clean lines and a limited color palette to convey the shape and style of the glasses in a stylized manner. This clipart should emphasize simplicity and clarity, focusing on the essential features of the glasses without intricate details, suitable for use in various graphic design contexts.">
+          <p:cNvPr id="3" name="Picture 2" descr="A drawing of eyes and eyebrows&#10;&#10;Description automatically generated">
             <a:extLst>
               <a:ext uri="{FF2B5EF4-FFF2-40B4-BE49-F238E27FC236}">
-                <a16:creationId xmlns:a16="http://schemas.microsoft.com/office/drawing/2014/main" id="{8B1D2004-D372-ECBA-5B96-04C3E4CF2355}"/>
+                <a16:creationId xmlns:a16="http://schemas.microsoft.com/office/drawing/2014/main" id="{90069B2B-BF98-3AD0-5BBB-A6A637463315}"/>
               </a:ext>
             </a:extLst>
           </p:cNvPr>
           <p:cNvPicPr>
-            <a:picLocks noChangeAspect="1" noChangeArrowheads="1"/>
+            <a:picLocks noChangeAspect="1"/>
           </p:cNvPicPr>
           <p:nvPr/>
         </p:nvPicPr>
         <p:blipFill>
-          <a:blip r:embed="rId2">
-            <a:extLst>
-              <a:ext uri="{28A0092B-C50C-407E-A947-70E740481C1C}">
-                <a14:useLocalDpi xmlns:a14="http://schemas.microsoft.com/office/drawing/2010/main" val="0"/>
-              </a:ext>
-            </a:extLst>
-          </a:blip>
-          <a:srcRect/>
+          <a:blip r:embed="rId2"/>
           <a:stretch>
             <a:fillRect/>
           </a:stretch>
         </p:blipFill>
-        <p:spPr bwMode="auto">
-          <a:xfrm>
-            <a:off x="0" y="0"/>
-            <a:ext cx="6858000" cy="6858000"/>
+        <p:spPr>
+          <a:xfrm flipH="1">
+            <a:off x="31750" y="31750"/>
+            <a:ext cx="6794500" cy="6794500"/>
           </a:xfrm>
           <a:prstGeom prst="rect">
             <a:avLst/>
           </a:prstGeom>
-          <a:noFill/>
-          <a:extLst>
-            <a:ext uri="{909E8E84-426E-40DD-AFC4-6F175D3DCCD1}">
-              <a14:hiddenFill xmlns:a14="http://schemas.microsoft.com/office/drawing/2010/main">
-                <a:solidFill>
-                  <a:srgbClr val="FFFFFF"/>
-                </a:solidFill>
-              </a14:hiddenFill>
-            </a:ext>
-          </a:extLst>
         </p:spPr>
       </p:pic>
       <p:sp>
@@ -3660,7 +5415,7 @@
           <p:cNvPr id="4" name="TextBox 3">
             <a:extLst>
               <a:ext uri="{FF2B5EF4-FFF2-40B4-BE49-F238E27FC236}">
-                <a16:creationId xmlns:a16="http://schemas.microsoft.com/office/drawing/2014/main" id="{DD3DB050-444C-84A6-C3A6-814154162CBE}"/>
+                <a16:creationId xmlns:a16="http://schemas.microsoft.com/office/drawing/2014/main" id="{E45DABC7-F23A-66DB-6042-779EDEC8979D}"/>
               </a:ext>
             </a:extLst>
           </p:cNvPr>
@@ -3695,7 +5450,7 @@
           <p:cNvPr id="5" name="TextBox 4">
             <a:extLst>
               <a:ext uri="{FF2B5EF4-FFF2-40B4-BE49-F238E27FC236}">
-                <a16:creationId xmlns:a16="http://schemas.microsoft.com/office/drawing/2014/main" id="{D813841F-542C-3CF3-1843-60219AD7C89C}"/>
+                <a16:creationId xmlns:a16="http://schemas.microsoft.com/office/drawing/2014/main" id="{FC600CAE-9B1B-45B7-730C-8A1244414A27}"/>
               </a:ext>
             </a:extLst>
           </p:cNvPr>
@@ -3730,7 +5485,7 @@
           <p:cNvPr id="7" name="Down Arrow 6">
             <a:extLst>
               <a:ext uri="{FF2B5EF4-FFF2-40B4-BE49-F238E27FC236}">
-                <a16:creationId xmlns:a16="http://schemas.microsoft.com/office/drawing/2014/main" id="{7004303B-3303-C5D9-69F9-34A94F804D05}"/>
+                <a16:creationId xmlns:a16="http://schemas.microsoft.com/office/drawing/2014/main" id="{818545A1-22E6-F779-F057-F544380C4B4C}"/>
               </a:ext>
             </a:extLst>
           </p:cNvPr>
@@ -3781,10 +5536,10 @@
       </p:sp>
       <p:cxnSp>
         <p:nvCxnSpPr>
-          <p:cNvPr id="11" name="Straight Connector 10">
+          <p:cNvPr id="13" name="Straight Connector 12">
             <a:extLst>
               <a:ext uri="{FF2B5EF4-FFF2-40B4-BE49-F238E27FC236}">
-                <a16:creationId xmlns:a16="http://schemas.microsoft.com/office/drawing/2014/main" id="{7831E3FE-3DFD-5C1E-7E8F-1F997BC4FDCF}"/>
+                <a16:creationId xmlns:a16="http://schemas.microsoft.com/office/drawing/2014/main" id="{CA131030-8366-9E48-7707-010C090A3075}"/>
               </a:ext>
             </a:extLst>
           </p:cNvPr>
@@ -3826,10 +5581,10 @@
       </p:cxnSp>
       <p:sp>
         <p:nvSpPr>
-          <p:cNvPr id="12" name="TextBox 11">
+          <p:cNvPr id="14" name="TextBox 13">
             <a:extLst>
               <a:ext uri="{FF2B5EF4-FFF2-40B4-BE49-F238E27FC236}">
-                <a16:creationId xmlns:a16="http://schemas.microsoft.com/office/drawing/2014/main" id="{39D7B8DA-417D-F9A0-FF82-1574A61DB218}"/>
+                <a16:creationId xmlns:a16="http://schemas.microsoft.com/office/drawing/2014/main" id="{E724DD3C-47E9-8028-AB60-6A2ACD765056}"/>
               </a:ext>
             </a:extLst>
           </p:cNvPr>
@@ -3864,10 +5619,10 @@
       </p:sp>
       <p:pic>
         <p:nvPicPr>
-          <p:cNvPr id="13" name="Picture 12">
+          <p:cNvPr id="16" name="Picture 15">
             <a:extLst>
               <a:ext uri="{FF2B5EF4-FFF2-40B4-BE49-F238E27FC236}">
-                <a16:creationId xmlns:a16="http://schemas.microsoft.com/office/drawing/2014/main" id="{EEE66007-29B0-2CE2-A5AA-22CB7BF034C0}"/>
+                <a16:creationId xmlns:a16="http://schemas.microsoft.com/office/drawing/2014/main" id="{8DFF7170-10B7-6BF8-6EF6-F76D1B83ABCB}"/>
               </a:ext>
             </a:extLst>
           </p:cNvPr>
@@ -3895,7 +5650,7 @@
     </p:spTree>
     <p:extLst>
       <p:ext uri="{BB962C8B-B14F-4D97-AF65-F5344CB8AC3E}">
-        <p14:creationId xmlns:p14="http://schemas.microsoft.com/office/powerpoint/2010/main" val="1939945645"/>
+        <p14:creationId xmlns:p14="http://schemas.microsoft.com/office/powerpoint/2010/main" val="3303165197"/>
       </p:ext>
     </p:extLst>
   </p:cSld>
@@ -3924,49 +5679,32 @@
       </p:grpSpPr>
       <p:pic>
         <p:nvPicPr>
-          <p:cNvPr id="2050" name="Picture 2" descr="Create a simple clipart illustration of a pair of glasses. The design should be minimalist, using clean lines and a limited color palette to convey the shape and style of the glasses in a stylized manner. This clipart should emphasize simplicity and clarity, focusing on the essential features of the glasses without intricate details, suitable for use in various graphic design contexts.">
+          <p:cNvPr id="2" name="Picture 1" descr="A drawing of eyes and eyebrows&#10;&#10;Description automatically generated">
             <a:extLst>
               <a:ext uri="{FF2B5EF4-FFF2-40B4-BE49-F238E27FC236}">
-                <a16:creationId xmlns:a16="http://schemas.microsoft.com/office/drawing/2014/main" id="{8B1D2004-D372-ECBA-5B96-04C3E4CF2355}"/>
+                <a16:creationId xmlns:a16="http://schemas.microsoft.com/office/drawing/2014/main" id="{062C60C2-9B75-F29B-C741-B5EF4F2FB34A}"/>
               </a:ext>
             </a:extLst>
           </p:cNvPr>
           <p:cNvPicPr>
-            <a:picLocks noChangeAspect="1" noChangeArrowheads="1"/>
+            <a:picLocks noChangeAspect="1"/>
           </p:cNvPicPr>
           <p:nvPr/>
         </p:nvPicPr>
         <p:blipFill>
-          <a:blip r:embed="rId2">
-            <a:extLst>
-              <a:ext uri="{28A0092B-C50C-407E-A947-70E740481C1C}">
-                <a14:useLocalDpi xmlns:a14="http://schemas.microsoft.com/office/drawing/2010/main" val="0"/>
-              </a:ext>
-            </a:extLst>
-          </a:blip>
-          <a:srcRect/>
+          <a:blip r:embed="rId2"/>
           <a:stretch>
             <a:fillRect/>
           </a:stretch>
         </p:blipFill>
-        <p:spPr bwMode="auto">
-          <a:xfrm>
-            <a:off x="0" y="0"/>
-            <a:ext cx="6858000" cy="6858000"/>
+        <p:spPr>
+          <a:xfrm>
+            <a:off x="31750" y="31750"/>
+            <a:ext cx="6794500" cy="6794500"/>
           </a:xfrm>
           <a:prstGeom prst="rect">
             <a:avLst/>
           </a:prstGeom>
-          <a:noFill/>
-          <a:extLst>
-            <a:ext uri="{909E8E84-426E-40DD-AFC4-6F175D3DCCD1}">
-              <a14:hiddenFill xmlns:a14="http://schemas.microsoft.com/office/drawing/2010/main">
-                <a:solidFill>
-                  <a:srgbClr val="FFFFFF"/>
-                </a:solidFill>
-              </a14:hiddenFill>
-            </a:ext>
-          </a:extLst>
         </p:spPr>
       </p:pic>
       <p:sp>
@@ -3974,7 +5712,7 @@
           <p:cNvPr id="4" name="TextBox 3">
             <a:extLst>
               <a:ext uri="{FF2B5EF4-FFF2-40B4-BE49-F238E27FC236}">
-                <a16:creationId xmlns:a16="http://schemas.microsoft.com/office/drawing/2014/main" id="{DD3DB050-444C-84A6-C3A6-814154162CBE}"/>
+                <a16:creationId xmlns:a16="http://schemas.microsoft.com/office/drawing/2014/main" id="{E45DABC7-F23A-66DB-6042-779EDEC8979D}"/>
               </a:ext>
             </a:extLst>
           </p:cNvPr>
@@ -4009,7 +5747,7 @@
           <p:cNvPr id="5" name="TextBox 4">
             <a:extLst>
               <a:ext uri="{FF2B5EF4-FFF2-40B4-BE49-F238E27FC236}">
-                <a16:creationId xmlns:a16="http://schemas.microsoft.com/office/drawing/2014/main" id="{D813841F-542C-3CF3-1843-60219AD7C89C}"/>
+                <a16:creationId xmlns:a16="http://schemas.microsoft.com/office/drawing/2014/main" id="{FC600CAE-9B1B-45B7-730C-8A1244414A27}"/>
               </a:ext>
             </a:extLst>
           </p:cNvPr>
@@ -4041,10 +5779,10 @@
       </p:sp>
       <p:sp>
         <p:nvSpPr>
-          <p:cNvPr id="2" name="Down Arrow 1">
+          <p:cNvPr id="7" name="Down Arrow 6">
             <a:extLst>
               <a:ext uri="{FF2B5EF4-FFF2-40B4-BE49-F238E27FC236}">
-                <a16:creationId xmlns:a16="http://schemas.microsoft.com/office/drawing/2014/main" id="{F8C8567F-F1D2-AE4C-9417-A4337694C76B}"/>
+                <a16:creationId xmlns:a16="http://schemas.microsoft.com/office/drawing/2014/main" id="{818545A1-22E6-F779-F057-F544380C4B4C}"/>
               </a:ext>
             </a:extLst>
           </p:cNvPr>
@@ -4095,10 +5833,10 @@
       </p:sp>
       <p:cxnSp>
         <p:nvCxnSpPr>
-          <p:cNvPr id="15" name="Straight Connector 14">
+          <p:cNvPr id="9" name="Straight Connector 8">
             <a:extLst>
               <a:ext uri="{FF2B5EF4-FFF2-40B4-BE49-F238E27FC236}">
-                <a16:creationId xmlns:a16="http://schemas.microsoft.com/office/drawing/2014/main" id="{83F610D3-AA8B-D788-1F0C-44030779D611}"/>
+                <a16:creationId xmlns:a16="http://schemas.microsoft.com/office/drawing/2014/main" id="{66B6F014-7FB7-D436-FFC6-61EFB4E5A9D0}"/>
               </a:ext>
             </a:extLst>
           </p:cNvPr>
@@ -4140,10 +5878,10 @@
       </p:cxnSp>
       <p:sp>
         <p:nvSpPr>
-          <p:cNvPr id="16" name="TextBox 15">
+          <p:cNvPr id="10" name="TextBox 9">
             <a:extLst>
               <a:ext uri="{FF2B5EF4-FFF2-40B4-BE49-F238E27FC236}">
-                <a16:creationId xmlns:a16="http://schemas.microsoft.com/office/drawing/2014/main" id="{495A952C-C84E-C857-C7FF-86109C9DD7EA}"/>
+                <a16:creationId xmlns:a16="http://schemas.microsoft.com/office/drawing/2014/main" id="{314B01B8-A373-9C4A-F830-A9A724A8C034}"/>
               </a:ext>
             </a:extLst>
           </p:cNvPr>
@@ -4178,10 +5916,10 @@
       </p:sp>
       <p:pic>
         <p:nvPicPr>
-          <p:cNvPr id="17" name="Picture 16">
+          <p:cNvPr id="11" name="Picture 10">
             <a:extLst>
               <a:ext uri="{FF2B5EF4-FFF2-40B4-BE49-F238E27FC236}">
-                <a16:creationId xmlns:a16="http://schemas.microsoft.com/office/drawing/2014/main" id="{A79A6D32-D110-EC49-CDF9-0F8AD3AD7ADC}"/>
+                <a16:creationId xmlns:a16="http://schemas.microsoft.com/office/drawing/2014/main" id="{3FFB1560-AC8F-6DC3-31C7-5AE3C9C27C8C}"/>
               </a:ext>
             </a:extLst>
           </p:cNvPr>
@@ -4209,7 +5947,7 @@
     </p:spTree>
     <p:extLst>
       <p:ext uri="{BB962C8B-B14F-4D97-AF65-F5344CB8AC3E}">
-        <p14:creationId xmlns:p14="http://schemas.microsoft.com/office/powerpoint/2010/main" val="1041926881"/>
+        <p14:creationId xmlns:p14="http://schemas.microsoft.com/office/powerpoint/2010/main" val="666807906"/>
       </p:ext>
     </p:extLst>
   </p:cSld>
@@ -4238,49 +5976,32 @@
       </p:grpSpPr>
       <p:pic>
         <p:nvPicPr>
-          <p:cNvPr id="1026" name="Picture 2" descr="Create a simple clipart illustration of a pair of eyes. The design should be minimalist, using clean lines and limited color to convey the shape and expression of the eyes in a stylized manner. This clipart should be straightforward, focusing on the essential features of the eyes without intricate details, suitable for use in various graphic design contexts where simplicity and clarity are key.">
+          <p:cNvPr id="3" name="Picture 2" descr="A black and white image of a pair of glasses&#10;&#10;Description automatically generated">
             <a:extLst>
               <a:ext uri="{FF2B5EF4-FFF2-40B4-BE49-F238E27FC236}">
-                <a16:creationId xmlns:a16="http://schemas.microsoft.com/office/drawing/2014/main" id="{C304A54A-5FAF-4BAA-206F-51FC8660B9C7}"/>
+                <a16:creationId xmlns:a16="http://schemas.microsoft.com/office/drawing/2014/main" id="{2EF428F2-01C5-5D1A-7EA7-F8B8619F4002}"/>
               </a:ext>
             </a:extLst>
           </p:cNvPr>
           <p:cNvPicPr>
-            <a:picLocks noChangeAspect="1" noChangeArrowheads="1"/>
+            <a:picLocks noChangeAspect="1"/>
           </p:cNvPicPr>
           <p:nvPr/>
         </p:nvPicPr>
         <p:blipFill>
-          <a:blip r:embed="rId2">
-            <a:extLst>
-              <a:ext uri="{28A0092B-C50C-407E-A947-70E740481C1C}">
-                <a14:useLocalDpi xmlns:a14="http://schemas.microsoft.com/office/drawing/2010/main" val="0"/>
-              </a:ext>
-            </a:extLst>
-          </a:blip>
-          <a:srcRect/>
+          <a:blip r:embed="rId2"/>
           <a:stretch>
             <a:fillRect/>
           </a:stretch>
         </p:blipFill>
-        <p:spPr bwMode="auto">
-          <a:xfrm>
-            <a:off x="0" y="0"/>
-            <a:ext cx="6858000" cy="6858000"/>
+        <p:spPr>
+          <a:xfrm flipH="1">
+            <a:off x="6326" y="0"/>
+            <a:ext cx="6845347" cy="6858000"/>
           </a:xfrm>
           <a:prstGeom prst="rect">
             <a:avLst/>
           </a:prstGeom>
-          <a:noFill/>
-          <a:extLst>
-            <a:ext uri="{909E8E84-426E-40DD-AFC4-6F175D3DCCD1}">
-              <a14:hiddenFill xmlns:a14="http://schemas.microsoft.com/office/drawing/2010/main">
-                <a:solidFill>
-                  <a:srgbClr val="FFFFFF"/>
-                </a:solidFill>
-              </a14:hiddenFill>
-            </a:ext>
-          </a:extLst>
         </p:spPr>
       </p:pic>
       <p:sp>
@@ -4288,7 +6009,7 @@
           <p:cNvPr id="4" name="TextBox 3">
             <a:extLst>
               <a:ext uri="{FF2B5EF4-FFF2-40B4-BE49-F238E27FC236}">
-                <a16:creationId xmlns:a16="http://schemas.microsoft.com/office/drawing/2014/main" id="{E45DABC7-F23A-66DB-6042-779EDEC8979D}"/>
+                <a16:creationId xmlns:a16="http://schemas.microsoft.com/office/drawing/2014/main" id="{DD3DB050-444C-84A6-C3A6-814154162CBE}"/>
               </a:ext>
             </a:extLst>
           </p:cNvPr>
@@ -4323,7 +6044,7 @@
           <p:cNvPr id="5" name="TextBox 4">
             <a:extLst>
               <a:ext uri="{FF2B5EF4-FFF2-40B4-BE49-F238E27FC236}">
-                <a16:creationId xmlns:a16="http://schemas.microsoft.com/office/drawing/2014/main" id="{FC600CAE-9B1B-45B7-730C-8A1244414A27}"/>
+                <a16:creationId xmlns:a16="http://schemas.microsoft.com/office/drawing/2014/main" id="{D813841F-542C-3CF3-1843-60219AD7C89C}"/>
               </a:ext>
             </a:extLst>
           </p:cNvPr>
@@ -4358,7 +6079,7 @@
           <p:cNvPr id="7" name="Down Arrow 6">
             <a:extLst>
               <a:ext uri="{FF2B5EF4-FFF2-40B4-BE49-F238E27FC236}">
-                <a16:creationId xmlns:a16="http://schemas.microsoft.com/office/drawing/2014/main" id="{818545A1-22E6-F779-F057-F544380C4B4C}"/>
+                <a16:creationId xmlns:a16="http://schemas.microsoft.com/office/drawing/2014/main" id="{7004303B-3303-C5D9-69F9-34A94F804D05}"/>
               </a:ext>
             </a:extLst>
           </p:cNvPr>
@@ -4409,10 +6130,10 @@
       </p:sp>
       <p:cxnSp>
         <p:nvCxnSpPr>
-          <p:cNvPr id="13" name="Straight Connector 12">
+          <p:cNvPr id="11" name="Straight Connector 10">
             <a:extLst>
               <a:ext uri="{FF2B5EF4-FFF2-40B4-BE49-F238E27FC236}">
-                <a16:creationId xmlns:a16="http://schemas.microsoft.com/office/drawing/2014/main" id="{CA131030-8366-9E48-7707-010C090A3075}"/>
+                <a16:creationId xmlns:a16="http://schemas.microsoft.com/office/drawing/2014/main" id="{7831E3FE-3DFD-5C1E-7E8F-1F997BC4FDCF}"/>
               </a:ext>
             </a:extLst>
           </p:cNvPr>
@@ -4423,8 +6144,8 @@
         </p:nvCxnSpPr>
         <p:spPr>
           <a:xfrm>
-            <a:off x="1200807" y="5966241"/>
-            <a:ext cx="2635469" cy="0"/>
+            <a:off x="1233891" y="5945221"/>
+            <a:ext cx="5012938" cy="0"/>
           </a:xfrm>
           <a:prstGeom prst="line">
             <a:avLst/>
@@ -4454,10 +6175,10 @@
       </p:cxnSp>
       <p:sp>
         <p:nvSpPr>
-          <p:cNvPr id="14" name="TextBox 13">
+          <p:cNvPr id="12" name="TextBox 11">
             <a:extLst>
               <a:ext uri="{FF2B5EF4-FFF2-40B4-BE49-F238E27FC236}">
-                <a16:creationId xmlns:a16="http://schemas.microsoft.com/office/drawing/2014/main" id="{E724DD3C-47E9-8028-AB60-6A2ACD765056}"/>
+                <a16:creationId xmlns:a16="http://schemas.microsoft.com/office/drawing/2014/main" id="{39D7B8DA-417D-F9A0-FF82-1574A61DB218}"/>
               </a:ext>
             </a:extLst>
           </p:cNvPr>
@@ -4466,7 +6187,7 @@
         </p:nvSpPr>
         <p:spPr>
           <a:xfrm>
-            <a:off x="1606097" y="5573826"/>
+            <a:off x="1639181" y="5552806"/>
             <a:ext cx="1911101" cy="784830"/>
           </a:xfrm>
           <a:prstGeom prst="rect">
@@ -4485,17 +6206,17 @@
             <a:pPr algn="ctr"/>
             <a:r>
               <a:rPr lang="en-US" sz="4500" b="1" dirty="0"/>
-              <a:t>0.40 m</a:t>
+              <a:t>2.00 m</a:t>
             </a:r>
           </a:p>
         </p:txBody>
       </p:sp>
       <p:pic>
         <p:nvPicPr>
-          <p:cNvPr id="3" name="Picture 2">
+          <p:cNvPr id="13" name="Picture 12">
             <a:extLst>
               <a:ext uri="{FF2B5EF4-FFF2-40B4-BE49-F238E27FC236}">
-                <a16:creationId xmlns:a16="http://schemas.microsoft.com/office/drawing/2014/main" id="{B1E0B7D0-BAD8-6AAE-0E95-AA5DED652D2E}"/>
+                <a16:creationId xmlns:a16="http://schemas.microsoft.com/office/drawing/2014/main" id="{EEE66007-29B0-2CE2-A5AA-22CB7BF034C0}"/>
               </a:ext>
             </a:extLst>
           </p:cNvPr>
@@ -4523,7 +6244,7 @@
     </p:spTree>
     <p:extLst>
       <p:ext uri="{BB962C8B-B14F-4D97-AF65-F5344CB8AC3E}">
-        <p14:creationId xmlns:p14="http://schemas.microsoft.com/office/powerpoint/2010/main" val="2585225563"/>
+        <p14:creationId xmlns:p14="http://schemas.microsoft.com/office/powerpoint/2010/main" val="1939945645"/>
       </p:ext>
     </p:extLst>
   </p:cSld>
@@ -4552,49 +6273,32 @@
       </p:grpSpPr>
       <p:pic>
         <p:nvPicPr>
-          <p:cNvPr id="1026" name="Picture 2" descr="Create a simple clipart illustration of a pair of eyes. The design should be minimalist, using clean lines and limited color to convey the shape and expression of the eyes in a stylized manner. This clipart should be straightforward, focusing on the essential features of the eyes without intricate details, suitable for use in various graphic design contexts where simplicity and clarity are key.">
+          <p:cNvPr id="6" name="Picture 5" descr="A black and white image of a pair of glasses&#10;&#10;Description automatically generated">
             <a:extLst>
               <a:ext uri="{FF2B5EF4-FFF2-40B4-BE49-F238E27FC236}">
-                <a16:creationId xmlns:a16="http://schemas.microsoft.com/office/drawing/2014/main" id="{C304A54A-5FAF-4BAA-206F-51FC8660B9C7}"/>
+                <a16:creationId xmlns:a16="http://schemas.microsoft.com/office/drawing/2014/main" id="{15B3A162-A91B-05A9-869B-97E84CAB7416}"/>
               </a:ext>
             </a:extLst>
           </p:cNvPr>
           <p:cNvPicPr>
-            <a:picLocks noChangeAspect="1" noChangeArrowheads="1"/>
+            <a:picLocks noChangeAspect="1"/>
           </p:cNvPicPr>
           <p:nvPr/>
         </p:nvPicPr>
         <p:blipFill>
-          <a:blip r:embed="rId2">
-            <a:extLst>
-              <a:ext uri="{28A0092B-C50C-407E-A947-70E740481C1C}">
-                <a14:useLocalDpi xmlns:a14="http://schemas.microsoft.com/office/drawing/2010/main" val="0"/>
-              </a:ext>
-            </a:extLst>
-          </a:blip>
-          <a:srcRect/>
+          <a:blip r:embed="rId2"/>
           <a:stretch>
             <a:fillRect/>
           </a:stretch>
         </p:blipFill>
-        <p:spPr bwMode="auto">
-          <a:xfrm>
-            <a:off x="0" y="0"/>
-            <a:ext cx="6858000" cy="6858000"/>
+        <p:spPr>
+          <a:xfrm>
+            <a:off x="6326" y="0"/>
+            <a:ext cx="6845347" cy="6858000"/>
           </a:xfrm>
           <a:prstGeom prst="rect">
             <a:avLst/>
           </a:prstGeom>
-          <a:noFill/>
-          <a:extLst>
-            <a:ext uri="{909E8E84-426E-40DD-AFC4-6F175D3DCCD1}">
-              <a14:hiddenFill xmlns:a14="http://schemas.microsoft.com/office/drawing/2010/main">
-                <a:solidFill>
-                  <a:srgbClr val="FFFFFF"/>
-                </a:solidFill>
-              </a14:hiddenFill>
-            </a:ext>
-          </a:extLst>
         </p:spPr>
       </p:pic>
       <p:sp>
@@ -4602,7 +6306,7 @@
           <p:cNvPr id="4" name="TextBox 3">
             <a:extLst>
               <a:ext uri="{FF2B5EF4-FFF2-40B4-BE49-F238E27FC236}">
-                <a16:creationId xmlns:a16="http://schemas.microsoft.com/office/drawing/2014/main" id="{E45DABC7-F23A-66DB-6042-779EDEC8979D}"/>
+                <a16:creationId xmlns:a16="http://schemas.microsoft.com/office/drawing/2014/main" id="{DD3DB050-444C-84A6-C3A6-814154162CBE}"/>
               </a:ext>
             </a:extLst>
           </p:cNvPr>
@@ -4637,7 +6341,7 @@
           <p:cNvPr id="5" name="TextBox 4">
             <a:extLst>
               <a:ext uri="{FF2B5EF4-FFF2-40B4-BE49-F238E27FC236}">
-                <a16:creationId xmlns:a16="http://schemas.microsoft.com/office/drawing/2014/main" id="{FC600CAE-9B1B-45B7-730C-8A1244414A27}"/>
+                <a16:creationId xmlns:a16="http://schemas.microsoft.com/office/drawing/2014/main" id="{D813841F-542C-3CF3-1843-60219AD7C89C}"/>
               </a:ext>
             </a:extLst>
           </p:cNvPr>
@@ -4669,10 +6373,10 @@
       </p:sp>
       <p:sp>
         <p:nvSpPr>
-          <p:cNvPr id="7" name="Down Arrow 6">
+          <p:cNvPr id="2" name="Down Arrow 1">
             <a:extLst>
               <a:ext uri="{FF2B5EF4-FFF2-40B4-BE49-F238E27FC236}">
-                <a16:creationId xmlns:a16="http://schemas.microsoft.com/office/drawing/2014/main" id="{818545A1-22E6-F779-F057-F544380C4B4C}"/>
+                <a16:creationId xmlns:a16="http://schemas.microsoft.com/office/drawing/2014/main" id="{F8C8567F-F1D2-AE4C-9417-A4337694C76B}"/>
               </a:ext>
             </a:extLst>
           </p:cNvPr>
@@ -4690,6 +6394,11 @@
           <a:solidFill>
             <a:schemeClr val="tx1"/>
           </a:solidFill>
+          <a:ln>
+            <a:solidFill>
+              <a:schemeClr val="tx1"/>
+            </a:solidFill>
+          </a:ln>
         </p:spPr>
         <p:style>
           <a:lnRef idx="2">
@@ -4718,10 +6427,10 @@
       </p:sp>
       <p:cxnSp>
         <p:nvCxnSpPr>
-          <p:cNvPr id="11" name="Straight Connector 10">
+          <p:cNvPr id="15" name="Straight Connector 14">
             <a:extLst>
               <a:ext uri="{FF2B5EF4-FFF2-40B4-BE49-F238E27FC236}">
-                <a16:creationId xmlns:a16="http://schemas.microsoft.com/office/drawing/2014/main" id="{F1A0C884-C5EE-D01F-C4AB-AA4F336987EA}"/>
+                <a16:creationId xmlns:a16="http://schemas.microsoft.com/office/drawing/2014/main" id="{83F610D3-AA8B-D788-1F0C-44030779D611}"/>
               </a:ext>
             </a:extLst>
           </p:cNvPr>
@@ -4732,8 +6441,8 @@
         </p:nvCxnSpPr>
         <p:spPr>
           <a:xfrm>
-            <a:off x="1200807" y="5966241"/>
-            <a:ext cx="2635469" cy="0"/>
+            <a:off x="1233891" y="5945221"/>
+            <a:ext cx="5012938" cy="0"/>
           </a:xfrm>
           <a:prstGeom prst="line">
             <a:avLst/>
@@ -4763,10 +6472,10 @@
       </p:cxnSp>
       <p:sp>
         <p:nvSpPr>
-          <p:cNvPr id="12" name="TextBox 11">
+          <p:cNvPr id="16" name="TextBox 15">
             <a:extLst>
               <a:ext uri="{FF2B5EF4-FFF2-40B4-BE49-F238E27FC236}">
-                <a16:creationId xmlns:a16="http://schemas.microsoft.com/office/drawing/2014/main" id="{B425109F-D4A6-D6A3-2413-19D0F1E31787}"/>
+                <a16:creationId xmlns:a16="http://schemas.microsoft.com/office/drawing/2014/main" id="{495A952C-C84E-C857-C7FF-86109C9DD7EA}"/>
               </a:ext>
             </a:extLst>
           </p:cNvPr>
@@ -4775,7 +6484,7 @@
         </p:nvSpPr>
         <p:spPr>
           <a:xfrm>
-            <a:off x="1606097" y="5573826"/>
+            <a:off x="1639181" y="5552806"/>
             <a:ext cx="1911101" cy="784830"/>
           </a:xfrm>
           <a:prstGeom prst="rect">
@@ -4794,17 +6503,17 @@
             <a:pPr algn="ctr"/>
             <a:r>
               <a:rPr lang="en-US" sz="4500" b="1" dirty="0"/>
-              <a:t>0.40 m</a:t>
+              <a:t>2.00 m</a:t>
             </a:r>
           </a:p>
         </p:txBody>
       </p:sp>
       <p:pic>
         <p:nvPicPr>
-          <p:cNvPr id="13" name="Picture 12">
+          <p:cNvPr id="17" name="Picture 16">
             <a:extLst>
               <a:ext uri="{FF2B5EF4-FFF2-40B4-BE49-F238E27FC236}">
-                <a16:creationId xmlns:a16="http://schemas.microsoft.com/office/drawing/2014/main" id="{600036AC-9572-AFFC-0621-0C537AE50508}"/>
+                <a16:creationId xmlns:a16="http://schemas.microsoft.com/office/drawing/2014/main" id="{A79A6D32-D110-EC49-CDF9-0F8AD3AD7ADC}"/>
               </a:ext>
             </a:extLst>
           </p:cNvPr>
@@ -4832,7 +6541,7 @@
     </p:spTree>
     <p:extLst>
       <p:ext uri="{BB962C8B-B14F-4D97-AF65-F5344CB8AC3E}">
-        <p14:creationId xmlns:p14="http://schemas.microsoft.com/office/powerpoint/2010/main" val="249751134"/>
+        <p14:creationId xmlns:p14="http://schemas.microsoft.com/office/powerpoint/2010/main" val="1041926881"/>
       </p:ext>
     </p:extLst>
   </p:cSld>
@@ -4861,49 +6570,32 @@
       </p:grpSpPr>
       <p:pic>
         <p:nvPicPr>
-          <p:cNvPr id="2050" name="Picture 2" descr="Create a simple clipart illustration of a pair of glasses. The design should be minimalist, using clean lines and a limited color palette to convey the shape and style of the glasses in a stylized manner. This clipart should emphasize simplicity and clarity, focusing on the essential features of the glasses without intricate details, suitable for use in various graphic design contexts.">
+          <p:cNvPr id="2" name="Picture 1" descr="A drawing of eyes and eyebrows&#10;&#10;Description automatically generated">
             <a:extLst>
               <a:ext uri="{FF2B5EF4-FFF2-40B4-BE49-F238E27FC236}">
-                <a16:creationId xmlns:a16="http://schemas.microsoft.com/office/drawing/2014/main" id="{8B1D2004-D372-ECBA-5B96-04C3E4CF2355}"/>
+                <a16:creationId xmlns:a16="http://schemas.microsoft.com/office/drawing/2014/main" id="{6D8EFF0D-5D74-1EDB-479F-363CFC944133}"/>
               </a:ext>
             </a:extLst>
           </p:cNvPr>
           <p:cNvPicPr>
-            <a:picLocks noChangeAspect="1" noChangeArrowheads="1"/>
+            <a:picLocks noChangeAspect="1"/>
           </p:cNvPicPr>
           <p:nvPr/>
         </p:nvPicPr>
         <p:blipFill>
-          <a:blip r:embed="rId2">
-            <a:extLst>
-              <a:ext uri="{28A0092B-C50C-407E-A947-70E740481C1C}">
-                <a14:useLocalDpi xmlns:a14="http://schemas.microsoft.com/office/drawing/2010/main" val="0"/>
-              </a:ext>
-            </a:extLst>
-          </a:blip>
-          <a:srcRect/>
+          <a:blip r:embed="rId2"/>
           <a:stretch>
             <a:fillRect/>
           </a:stretch>
         </p:blipFill>
-        <p:spPr bwMode="auto">
-          <a:xfrm>
-            <a:off x="0" y="0"/>
-            <a:ext cx="6858000" cy="6858000"/>
+        <p:spPr>
+          <a:xfrm flipH="1">
+            <a:off x="31750" y="31750"/>
+            <a:ext cx="6794500" cy="6794500"/>
           </a:xfrm>
           <a:prstGeom prst="rect">
             <a:avLst/>
           </a:prstGeom>
-          <a:noFill/>
-          <a:extLst>
-            <a:ext uri="{909E8E84-426E-40DD-AFC4-6F175D3DCCD1}">
-              <a14:hiddenFill xmlns:a14="http://schemas.microsoft.com/office/drawing/2010/main">
-                <a:solidFill>
-                  <a:srgbClr val="FFFFFF"/>
-                </a:solidFill>
-              </a14:hiddenFill>
-            </a:ext>
-          </a:extLst>
         </p:spPr>
       </p:pic>
       <p:sp>
@@ -4911,7 +6603,7 @@
           <p:cNvPr id="4" name="TextBox 3">
             <a:extLst>
               <a:ext uri="{FF2B5EF4-FFF2-40B4-BE49-F238E27FC236}">
-                <a16:creationId xmlns:a16="http://schemas.microsoft.com/office/drawing/2014/main" id="{DD3DB050-444C-84A6-C3A6-814154162CBE}"/>
+                <a16:creationId xmlns:a16="http://schemas.microsoft.com/office/drawing/2014/main" id="{E45DABC7-F23A-66DB-6042-779EDEC8979D}"/>
               </a:ext>
             </a:extLst>
           </p:cNvPr>
@@ -4946,7 +6638,7 @@
           <p:cNvPr id="5" name="TextBox 4">
             <a:extLst>
               <a:ext uri="{FF2B5EF4-FFF2-40B4-BE49-F238E27FC236}">
-                <a16:creationId xmlns:a16="http://schemas.microsoft.com/office/drawing/2014/main" id="{D813841F-542C-3CF3-1843-60219AD7C89C}"/>
+                <a16:creationId xmlns:a16="http://schemas.microsoft.com/office/drawing/2014/main" id="{FC600CAE-9B1B-45B7-730C-8A1244414A27}"/>
               </a:ext>
             </a:extLst>
           </p:cNvPr>
@@ -4981,7 +6673,7 @@
           <p:cNvPr id="7" name="Down Arrow 6">
             <a:extLst>
               <a:ext uri="{FF2B5EF4-FFF2-40B4-BE49-F238E27FC236}">
-                <a16:creationId xmlns:a16="http://schemas.microsoft.com/office/drawing/2014/main" id="{7004303B-3303-C5D9-69F9-34A94F804D05}"/>
+                <a16:creationId xmlns:a16="http://schemas.microsoft.com/office/drawing/2014/main" id="{818545A1-22E6-F779-F057-F544380C4B4C}"/>
               </a:ext>
             </a:extLst>
           </p:cNvPr>
@@ -4999,6 +6691,11 @@
           <a:solidFill>
             <a:schemeClr val="tx1"/>
           </a:solidFill>
+          <a:ln>
+            <a:solidFill>
+              <a:schemeClr val="tx1"/>
+            </a:solidFill>
+          </a:ln>
         </p:spPr>
         <p:style>
           <a:lnRef idx="2">
@@ -5027,10 +6724,10 @@
       </p:sp>
       <p:cxnSp>
         <p:nvCxnSpPr>
-          <p:cNvPr id="10" name="Straight Connector 9">
+          <p:cNvPr id="13" name="Straight Connector 12">
             <a:extLst>
               <a:ext uri="{FF2B5EF4-FFF2-40B4-BE49-F238E27FC236}">
-                <a16:creationId xmlns:a16="http://schemas.microsoft.com/office/drawing/2014/main" id="{06E72651-35AE-4320-B46B-66FAD32E3D33}"/>
+                <a16:creationId xmlns:a16="http://schemas.microsoft.com/office/drawing/2014/main" id="{CA131030-8366-9E48-7707-010C090A3075}"/>
               </a:ext>
             </a:extLst>
           </p:cNvPr>
@@ -5072,10 +6769,10 @@
       </p:cxnSp>
       <p:sp>
         <p:nvSpPr>
-          <p:cNvPr id="11" name="TextBox 10">
+          <p:cNvPr id="14" name="TextBox 13">
             <a:extLst>
               <a:ext uri="{FF2B5EF4-FFF2-40B4-BE49-F238E27FC236}">
-                <a16:creationId xmlns:a16="http://schemas.microsoft.com/office/drawing/2014/main" id="{D55B3857-8B21-C194-2E25-4E8110F07558}"/>
+                <a16:creationId xmlns:a16="http://schemas.microsoft.com/office/drawing/2014/main" id="{E724DD3C-47E9-8028-AB60-6A2ACD765056}"/>
               </a:ext>
             </a:extLst>
           </p:cNvPr>
@@ -5110,10 +6807,10 @@
       </p:sp>
       <p:pic>
         <p:nvPicPr>
-          <p:cNvPr id="12" name="Picture 11">
+          <p:cNvPr id="3" name="Picture 2">
             <a:extLst>
               <a:ext uri="{FF2B5EF4-FFF2-40B4-BE49-F238E27FC236}">
-                <a16:creationId xmlns:a16="http://schemas.microsoft.com/office/drawing/2014/main" id="{EC8CB2F3-2BA4-9A44-EE0E-9DCC14E0546F}"/>
+                <a16:creationId xmlns:a16="http://schemas.microsoft.com/office/drawing/2014/main" id="{B1E0B7D0-BAD8-6AAE-0E95-AA5DED652D2E}"/>
               </a:ext>
             </a:extLst>
           </p:cNvPr>
@@ -5141,7 +6838,7 @@
     </p:spTree>
     <p:extLst>
       <p:ext uri="{BB962C8B-B14F-4D97-AF65-F5344CB8AC3E}">
-        <p14:creationId xmlns:p14="http://schemas.microsoft.com/office/powerpoint/2010/main" val="4160476007"/>
+        <p14:creationId xmlns:p14="http://schemas.microsoft.com/office/powerpoint/2010/main" val="2585225563"/>
       </p:ext>
     </p:extLst>
   </p:cSld>
@@ -5170,49 +6867,32 @@
       </p:grpSpPr>
       <p:pic>
         <p:nvPicPr>
-          <p:cNvPr id="2050" name="Picture 2" descr="Create a simple clipart illustration of a pair of glasses. The design should be minimalist, using clean lines and a limited color palette to convey the shape and style of the glasses in a stylized manner. This clipart should emphasize simplicity and clarity, focusing on the essential features of the glasses without intricate details, suitable for use in various graphic design contexts.">
+          <p:cNvPr id="2" name="Picture 1" descr="A drawing of eyes and eyebrows&#10;&#10;Description automatically generated">
             <a:extLst>
               <a:ext uri="{FF2B5EF4-FFF2-40B4-BE49-F238E27FC236}">
-                <a16:creationId xmlns:a16="http://schemas.microsoft.com/office/drawing/2014/main" id="{8B1D2004-D372-ECBA-5B96-04C3E4CF2355}"/>
+                <a16:creationId xmlns:a16="http://schemas.microsoft.com/office/drawing/2014/main" id="{6C493526-D395-FBCD-943A-36B8DE9D1EBD}"/>
               </a:ext>
             </a:extLst>
           </p:cNvPr>
           <p:cNvPicPr>
-            <a:picLocks noChangeAspect="1" noChangeArrowheads="1"/>
+            <a:picLocks noChangeAspect="1"/>
           </p:cNvPicPr>
           <p:nvPr/>
         </p:nvPicPr>
         <p:blipFill>
-          <a:blip r:embed="rId2">
-            <a:extLst>
-              <a:ext uri="{28A0092B-C50C-407E-A947-70E740481C1C}">
-                <a14:useLocalDpi xmlns:a14="http://schemas.microsoft.com/office/drawing/2010/main" val="0"/>
-              </a:ext>
-            </a:extLst>
-          </a:blip>
-          <a:srcRect/>
+          <a:blip r:embed="rId2"/>
           <a:stretch>
             <a:fillRect/>
           </a:stretch>
         </p:blipFill>
-        <p:spPr bwMode="auto">
-          <a:xfrm>
-            <a:off x="0" y="0"/>
-            <a:ext cx="6858000" cy="6858000"/>
+        <p:spPr>
+          <a:xfrm>
+            <a:off x="31750" y="31750"/>
+            <a:ext cx="6794500" cy="6794500"/>
           </a:xfrm>
           <a:prstGeom prst="rect">
             <a:avLst/>
           </a:prstGeom>
-          <a:noFill/>
-          <a:extLst>
-            <a:ext uri="{909E8E84-426E-40DD-AFC4-6F175D3DCCD1}">
-              <a14:hiddenFill xmlns:a14="http://schemas.microsoft.com/office/drawing/2010/main">
-                <a:solidFill>
-                  <a:srgbClr val="FFFFFF"/>
-                </a:solidFill>
-              </a14:hiddenFill>
-            </a:ext>
-          </a:extLst>
         </p:spPr>
       </p:pic>
       <p:sp>
@@ -5220,7 +6900,7 @@
           <p:cNvPr id="4" name="TextBox 3">
             <a:extLst>
               <a:ext uri="{FF2B5EF4-FFF2-40B4-BE49-F238E27FC236}">
-                <a16:creationId xmlns:a16="http://schemas.microsoft.com/office/drawing/2014/main" id="{DD3DB050-444C-84A6-C3A6-814154162CBE}"/>
+                <a16:creationId xmlns:a16="http://schemas.microsoft.com/office/drawing/2014/main" id="{E45DABC7-F23A-66DB-6042-779EDEC8979D}"/>
               </a:ext>
             </a:extLst>
           </p:cNvPr>
@@ -5255,7 +6935,7 @@
           <p:cNvPr id="5" name="TextBox 4">
             <a:extLst>
               <a:ext uri="{FF2B5EF4-FFF2-40B4-BE49-F238E27FC236}">
-                <a16:creationId xmlns:a16="http://schemas.microsoft.com/office/drawing/2014/main" id="{D813841F-542C-3CF3-1843-60219AD7C89C}"/>
+                <a16:creationId xmlns:a16="http://schemas.microsoft.com/office/drawing/2014/main" id="{FC600CAE-9B1B-45B7-730C-8A1244414A27}"/>
               </a:ext>
             </a:extLst>
           </p:cNvPr>
@@ -5287,10 +6967,10 @@
       </p:sp>
       <p:sp>
         <p:nvSpPr>
-          <p:cNvPr id="2" name="Down Arrow 1">
+          <p:cNvPr id="7" name="Down Arrow 6">
             <a:extLst>
               <a:ext uri="{FF2B5EF4-FFF2-40B4-BE49-F238E27FC236}">
-                <a16:creationId xmlns:a16="http://schemas.microsoft.com/office/drawing/2014/main" id="{F8C8567F-F1D2-AE4C-9417-A4337694C76B}"/>
+                <a16:creationId xmlns:a16="http://schemas.microsoft.com/office/drawing/2014/main" id="{818545A1-22E6-F779-F057-F544380C4B4C}"/>
               </a:ext>
             </a:extLst>
           </p:cNvPr>
@@ -5336,10 +7016,10 @@
       </p:sp>
       <p:cxnSp>
         <p:nvCxnSpPr>
-          <p:cNvPr id="10" name="Straight Connector 9">
+          <p:cNvPr id="11" name="Straight Connector 10">
             <a:extLst>
               <a:ext uri="{FF2B5EF4-FFF2-40B4-BE49-F238E27FC236}">
-                <a16:creationId xmlns:a16="http://schemas.microsoft.com/office/drawing/2014/main" id="{84BD5686-3C75-30D0-6175-82F4CCE2A4D0}"/>
+                <a16:creationId xmlns:a16="http://schemas.microsoft.com/office/drawing/2014/main" id="{F1A0C884-C5EE-D01F-C4AB-AA4F336987EA}"/>
               </a:ext>
             </a:extLst>
           </p:cNvPr>
@@ -5381,10 +7061,10 @@
       </p:cxnSp>
       <p:sp>
         <p:nvSpPr>
-          <p:cNvPr id="11" name="TextBox 10">
+          <p:cNvPr id="12" name="TextBox 11">
             <a:extLst>
               <a:ext uri="{FF2B5EF4-FFF2-40B4-BE49-F238E27FC236}">
-                <a16:creationId xmlns:a16="http://schemas.microsoft.com/office/drawing/2014/main" id="{2DEB142F-A586-A663-4BEB-91A210113B2A}"/>
+                <a16:creationId xmlns:a16="http://schemas.microsoft.com/office/drawing/2014/main" id="{B425109F-D4A6-D6A3-2413-19D0F1E31787}"/>
               </a:ext>
             </a:extLst>
           </p:cNvPr>
@@ -5419,10 +7099,10 @@
       </p:sp>
       <p:pic>
         <p:nvPicPr>
-          <p:cNvPr id="12" name="Picture 11">
+          <p:cNvPr id="13" name="Picture 12">
             <a:extLst>
               <a:ext uri="{FF2B5EF4-FFF2-40B4-BE49-F238E27FC236}">
-                <a16:creationId xmlns:a16="http://schemas.microsoft.com/office/drawing/2014/main" id="{8F0AC390-22CF-3906-B38D-B270FE406B6E}"/>
+                <a16:creationId xmlns:a16="http://schemas.microsoft.com/office/drawing/2014/main" id="{600036AC-9572-AFFC-0621-0C537AE50508}"/>
               </a:ext>
             </a:extLst>
           </p:cNvPr>
@@ -5450,7 +7130,299 @@
     </p:spTree>
     <p:extLst>
       <p:ext uri="{BB962C8B-B14F-4D97-AF65-F5344CB8AC3E}">
-        <p14:creationId xmlns:p14="http://schemas.microsoft.com/office/powerpoint/2010/main" val="3195913424"/>
+        <p14:creationId xmlns:p14="http://schemas.microsoft.com/office/powerpoint/2010/main" val="249751134"/>
+      </p:ext>
+    </p:extLst>
+  </p:cSld>
+  <p:clrMapOvr>
+    <a:masterClrMapping/>
+  </p:clrMapOvr>
+</p:sld>
+</file>
+
+<file path=ppt/slides/slide9.xml><?xml version="1.0" encoding="utf-8"?>
+<p:sld xmlns:a="http://schemas.openxmlformats.org/drawingml/2006/main" xmlns:r="http://schemas.openxmlformats.org/officeDocument/2006/relationships" xmlns:p="http://schemas.openxmlformats.org/presentationml/2006/main">
+  <p:cSld>
+    <p:spTree>
+      <p:nvGrpSpPr>
+        <p:cNvPr id="1" name=""/>
+        <p:cNvGrpSpPr/>
+        <p:nvPr/>
+      </p:nvGrpSpPr>
+      <p:grpSpPr>
+        <a:xfrm>
+          <a:off x="0" y="0"/>
+          <a:ext cx="0" cy="0"/>
+          <a:chOff x="0" y="0"/>
+          <a:chExt cx="0" cy="0"/>
+        </a:xfrm>
+      </p:grpSpPr>
+      <p:pic>
+        <p:nvPicPr>
+          <p:cNvPr id="2" name="Picture 1" descr="A black and white image of a pair of glasses&#10;&#10;Description automatically generated">
+            <a:extLst>
+              <a:ext uri="{FF2B5EF4-FFF2-40B4-BE49-F238E27FC236}">
+                <a16:creationId xmlns:a16="http://schemas.microsoft.com/office/drawing/2014/main" id="{1F39E997-497F-7BF3-9F7F-9FB9DD4E1E45}"/>
+              </a:ext>
+            </a:extLst>
+          </p:cNvPr>
+          <p:cNvPicPr>
+            <a:picLocks noChangeAspect="1"/>
+          </p:cNvPicPr>
+          <p:nvPr/>
+        </p:nvPicPr>
+        <p:blipFill>
+          <a:blip r:embed="rId2"/>
+          <a:stretch>
+            <a:fillRect/>
+          </a:stretch>
+        </p:blipFill>
+        <p:spPr>
+          <a:xfrm flipH="1">
+            <a:off x="6326" y="0"/>
+            <a:ext cx="6845347" cy="6858000"/>
+          </a:xfrm>
+          <a:prstGeom prst="rect">
+            <a:avLst/>
+          </a:prstGeom>
+        </p:spPr>
+      </p:pic>
+      <p:sp>
+        <p:nvSpPr>
+          <p:cNvPr id="4" name="TextBox 3">
+            <a:extLst>
+              <a:ext uri="{FF2B5EF4-FFF2-40B4-BE49-F238E27FC236}">
+                <a16:creationId xmlns:a16="http://schemas.microsoft.com/office/drawing/2014/main" id="{DD3DB050-444C-84A6-C3A6-814154162CBE}"/>
+              </a:ext>
+            </a:extLst>
+          </p:cNvPr>
+          <p:cNvSpPr txBox="1"/>
+          <p:nvPr/>
+        </p:nvSpPr>
+        <p:spPr>
+          <a:xfrm>
+            <a:off x="4514194" y="4247613"/>
+            <a:ext cx="1415772" cy="784830"/>
+          </a:xfrm>
+          <a:prstGeom prst="rect">
+            <a:avLst/>
+          </a:prstGeom>
+          <a:noFill/>
+        </p:spPr>
+        <p:txBody>
+          <a:bodyPr wrap="none" rtlCol="0">
+            <a:spAutoFit/>
+          </a:bodyPr>
+          <a:lstStyle/>
+          <a:p>
+            <a:r>
+              <a:rPr lang="en-US" sz="4500" b="1" dirty="0"/>
+              <a:t>LEFT</a:t>
+            </a:r>
+          </a:p>
+        </p:txBody>
+      </p:sp>
+      <p:sp>
+        <p:nvSpPr>
+          <p:cNvPr id="5" name="TextBox 4">
+            <a:extLst>
+              <a:ext uri="{FF2B5EF4-FFF2-40B4-BE49-F238E27FC236}">
+                <a16:creationId xmlns:a16="http://schemas.microsoft.com/office/drawing/2014/main" id="{D813841F-542C-3CF3-1843-60219AD7C89C}"/>
+              </a:ext>
+            </a:extLst>
+          </p:cNvPr>
+          <p:cNvSpPr txBox="1"/>
+          <p:nvPr/>
+        </p:nvSpPr>
+        <p:spPr>
+          <a:xfrm>
+            <a:off x="528640" y="4247613"/>
+            <a:ext cx="1845377" cy="784830"/>
+          </a:xfrm>
+          <a:prstGeom prst="rect">
+            <a:avLst/>
+          </a:prstGeom>
+          <a:noFill/>
+        </p:spPr>
+        <p:txBody>
+          <a:bodyPr wrap="none" rtlCol="0">
+            <a:spAutoFit/>
+          </a:bodyPr>
+          <a:lstStyle/>
+          <a:p>
+            <a:r>
+              <a:rPr lang="en-US" sz="4500" b="1" dirty="0"/>
+              <a:t>RIGHT</a:t>
+            </a:r>
+          </a:p>
+        </p:txBody>
+      </p:sp>
+      <p:sp>
+        <p:nvSpPr>
+          <p:cNvPr id="7" name="Down Arrow 6">
+            <a:extLst>
+              <a:ext uri="{FF2B5EF4-FFF2-40B4-BE49-F238E27FC236}">
+                <a16:creationId xmlns:a16="http://schemas.microsoft.com/office/drawing/2014/main" id="{7004303B-3303-C5D9-69F9-34A94F804D05}"/>
+              </a:ext>
+            </a:extLst>
+          </p:cNvPr>
+          <p:cNvSpPr/>
+          <p:nvPr/>
+        </p:nvSpPr>
+        <p:spPr>
+          <a:xfrm>
+            <a:off x="4437497" y="315310"/>
+            <a:ext cx="1492469" cy="1980232"/>
+          </a:xfrm>
+          <a:prstGeom prst="downArrow">
+            <a:avLst/>
+          </a:prstGeom>
+          <a:solidFill>
+            <a:schemeClr val="tx1"/>
+          </a:solidFill>
+        </p:spPr>
+        <p:style>
+          <a:lnRef idx="2">
+            <a:schemeClr val="accent1">
+              <a:shade val="15000"/>
+            </a:schemeClr>
+          </a:lnRef>
+          <a:fillRef idx="1">
+            <a:schemeClr val="accent1"/>
+          </a:fillRef>
+          <a:effectRef idx="0">
+            <a:schemeClr val="accent1"/>
+          </a:effectRef>
+          <a:fontRef idx="minor">
+            <a:schemeClr val="lt1"/>
+          </a:fontRef>
+        </p:style>
+        <p:txBody>
+          <a:bodyPr rtlCol="0" anchor="ctr"/>
+          <a:lstStyle/>
+          <a:p>
+            <a:pPr algn="ctr"/>
+            <a:endParaRPr lang="en-US"/>
+          </a:p>
+        </p:txBody>
+      </p:sp>
+      <p:cxnSp>
+        <p:nvCxnSpPr>
+          <p:cNvPr id="10" name="Straight Connector 9">
+            <a:extLst>
+              <a:ext uri="{FF2B5EF4-FFF2-40B4-BE49-F238E27FC236}">
+                <a16:creationId xmlns:a16="http://schemas.microsoft.com/office/drawing/2014/main" id="{06E72651-35AE-4320-B46B-66FAD32E3D33}"/>
+              </a:ext>
+            </a:extLst>
+          </p:cNvPr>
+          <p:cNvCxnSpPr>
+            <a:cxnSpLocks/>
+          </p:cNvCxnSpPr>
+          <p:nvPr/>
+        </p:nvCxnSpPr>
+        <p:spPr>
+          <a:xfrm>
+            <a:off x="1200807" y="5966241"/>
+            <a:ext cx="2635469" cy="0"/>
+          </a:xfrm>
+          <a:prstGeom prst="line">
+            <a:avLst/>
+          </a:prstGeom>
+          <a:ln w="82550">
+            <a:solidFill>
+              <a:schemeClr val="tx1"/>
+            </a:solidFill>
+            <a:headEnd type="none"/>
+            <a:tailEnd type="triangle"/>
+          </a:ln>
+        </p:spPr>
+        <p:style>
+          <a:lnRef idx="2">
+            <a:schemeClr val="accent1"/>
+          </a:lnRef>
+          <a:fillRef idx="0">
+            <a:schemeClr val="accent1"/>
+          </a:fillRef>
+          <a:effectRef idx="1">
+            <a:schemeClr val="accent1"/>
+          </a:effectRef>
+          <a:fontRef idx="minor">
+            <a:schemeClr val="tx1"/>
+          </a:fontRef>
+        </p:style>
+      </p:cxnSp>
+      <p:sp>
+        <p:nvSpPr>
+          <p:cNvPr id="11" name="TextBox 10">
+            <a:extLst>
+              <a:ext uri="{FF2B5EF4-FFF2-40B4-BE49-F238E27FC236}">
+                <a16:creationId xmlns:a16="http://schemas.microsoft.com/office/drawing/2014/main" id="{D55B3857-8B21-C194-2E25-4E8110F07558}"/>
+              </a:ext>
+            </a:extLst>
+          </p:cNvPr>
+          <p:cNvSpPr txBox="1"/>
+          <p:nvPr/>
+        </p:nvSpPr>
+        <p:spPr>
+          <a:xfrm>
+            <a:off x="1606097" y="5573826"/>
+            <a:ext cx="1911101" cy="784830"/>
+          </a:xfrm>
+          <a:prstGeom prst="rect">
+            <a:avLst/>
+          </a:prstGeom>
+          <a:solidFill>
+            <a:srgbClr val="FFF7EC"/>
+          </a:solidFill>
+        </p:spPr>
+        <p:txBody>
+          <a:bodyPr wrap="none" rtlCol="0">
+            <a:spAutoFit/>
+          </a:bodyPr>
+          <a:lstStyle/>
+          <a:p>
+            <a:pPr algn="ctr"/>
+            <a:r>
+              <a:rPr lang="en-US" sz="4500" b="1" dirty="0"/>
+              <a:t>0.40 m</a:t>
+            </a:r>
+          </a:p>
+        </p:txBody>
+      </p:sp>
+      <p:pic>
+        <p:nvPicPr>
+          <p:cNvPr id="12" name="Picture 11">
+            <a:extLst>
+              <a:ext uri="{FF2B5EF4-FFF2-40B4-BE49-F238E27FC236}">
+                <a16:creationId xmlns:a16="http://schemas.microsoft.com/office/drawing/2014/main" id="{EC8CB2F3-2BA4-9A44-EE0E-9DCC14E0546F}"/>
+              </a:ext>
+            </a:extLst>
+          </p:cNvPr>
+          <p:cNvPicPr>
+            <a:picLocks noChangeAspect="1"/>
+          </p:cNvPicPr>
+          <p:nvPr/>
+        </p:nvPicPr>
+        <p:blipFill>
+          <a:blip r:embed="rId3"/>
+          <a:stretch>
+            <a:fillRect/>
+          </a:stretch>
+        </p:blipFill>
+        <p:spPr>
+          <a:xfrm>
+            <a:off x="199776" y="5464694"/>
+            <a:ext cx="1034115" cy="1263650"/>
+          </a:xfrm>
+          <a:prstGeom prst="rect">
+            <a:avLst/>
+          </a:prstGeom>
+        </p:spPr>
+      </p:pic>
+    </p:spTree>
+    <p:extLst>
+      <p:ext uri="{BB962C8B-B14F-4D97-AF65-F5344CB8AC3E}">
+        <p14:creationId xmlns:p14="http://schemas.microsoft.com/office/powerpoint/2010/main" val="4160476007"/>
       </p:ext>
     </p:extLst>
   </p:cSld>

</xml_diff>